<commit_message>
updates to files for W5D3
</commit_message>
<xml_diff>
--- a/W5D3/Trees and Forests.pptx
+++ b/W5D3/Trees and Forests.pptx
@@ -6,26 +6,27 @@
   </p:sldMasterIdLst>
   <p:sldIdLst>
     <p:sldId id="256" r:id="rId2"/>
-    <p:sldId id="257" r:id="rId3"/>
-    <p:sldId id="258" r:id="rId4"/>
-    <p:sldId id="259" r:id="rId5"/>
-    <p:sldId id="261" r:id="rId6"/>
-    <p:sldId id="268" r:id="rId7"/>
-    <p:sldId id="262" r:id="rId8"/>
-    <p:sldId id="263" r:id="rId9"/>
-    <p:sldId id="264" r:id="rId10"/>
-    <p:sldId id="265" r:id="rId11"/>
-    <p:sldId id="266" r:id="rId12"/>
-    <p:sldId id="267" r:id="rId13"/>
-    <p:sldId id="269" r:id="rId14"/>
-    <p:sldId id="271" r:id="rId15"/>
-    <p:sldId id="270" r:id="rId16"/>
-    <p:sldId id="272" r:id="rId17"/>
-    <p:sldId id="273" r:id="rId18"/>
-    <p:sldId id="274" r:id="rId19"/>
-    <p:sldId id="276" r:id="rId20"/>
-    <p:sldId id="275" r:id="rId21"/>
-    <p:sldId id="277" r:id="rId22"/>
+    <p:sldId id="278" r:id="rId3"/>
+    <p:sldId id="257" r:id="rId4"/>
+    <p:sldId id="258" r:id="rId5"/>
+    <p:sldId id="259" r:id="rId6"/>
+    <p:sldId id="261" r:id="rId7"/>
+    <p:sldId id="268" r:id="rId8"/>
+    <p:sldId id="262" r:id="rId9"/>
+    <p:sldId id="263" r:id="rId10"/>
+    <p:sldId id="264" r:id="rId11"/>
+    <p:sldId id="265" r:id="rId12"/>
+    <p:sldId id="266" r:id="rId13"/>
+    <p:sldId id="267" r:id="rId14"/>
+    <p:sldId id="269" r:id="rId15"/>
+    <p:sldId id="271" r:id="rId16"/>
+    <p:sldId id="270" r:id="rId17"/>
+    <p:sldId id="272" r:id="rId18"/>
+    <p:sldId id="273" r:id="rId19"/>
+    <p:sldId id="274" r:id="rId20"/>
+    <p:sldId id="276" r:id="rId21"/>
+    <p:sldId id="275" r:id="rId22"/>
+    <p:sldId id="277" r:id="rId23"/>
   </p:sldIdLst>
   <p:sldSz cx="12192000" cy="6858000"/>
   <p:notesSz cx="6858000" cy="9144000"/>
@@ -303,7 +304,7 @@
           <a:p>
             <a:fld id="{48A87A34-81AB-432B-8DAE-1953F412C126}" type="datetimeFigureOut">
               <a:rPr lang="en-US" dirty="0"/>
-              <a:t>10/14/2020</a:t>
+              <a:t>2/3/2021</a:t>
             </a:fld>
             <a:endParaRPr lang="en-US" dirty="0"/>
           </a:p>
@@ -613,7 +614,7 @@
           <a:p>
             <a:fld id="{48A87A34-81AB-432B-8DAE-1953F412C126}" type="datetimeFigureOut">
               <a:rPr lang="en-US" dirty="0"/>
-              <a:t>10/14/2020</a:t>
+              <a:t>2/3/2021</a:t>
             </a:fld>
             <a:endParaRPr lang="en-US" dirty="0"/>
           </a:p>
@@ -830,7 +831,7 @@
           <a:p>
             <a:fld id="{48A87A34-81AB-432B-8DAE-1953F412C126}" type="datetimeFigureOut">
               <a:rPr lang="en-US" dirty="0"/>
-              <a:t>10/14/2020</a:t>
+              <a:t>2/3/2021</a:t>
             </a:fld>
             <a:endParaRPr lang="en-US" dirty="0"/>
           </a:p>
@@ -1116,7 +1117,7 @@
           <a:p>
             <a:fld id="{48A87A34-81AB-432B-8DAE-1953F412C126}" type="datetimeFigureOut">
               <a:rPr lang="en-US" dirty="0"/>
-              <a:t>10/14/2020</a:t>
+              <a:t>2/3/2021</a:t>
             </a:fld>
             <a:endParaRPr lang="en-US" dirty="0"/>
           </a:p>
@@ -1565,7 +1566,7 @@
           <a:p>
             <a:fld id="{48A87A34-81AB-432B-8DAE-1953F412C126}" type="datetimeFigureOut">
               <a:rPr lang="en-US" dirty="0"/>
-              <a:t>10/14/2020</a:t>
+              <a:t>2/3/2021</a:t>
             </a:fld>
             <a:endParaRPr lang="en-US" dirty="0"/>
           </a:p>
@@ -2136,7 +2137,7 @@
           <a:p>
             <a:fld id="{48A87A34-81AB-432B-8DAE-1953F412C126}" type="datetimeFigureOut">
               <a:rPr lang="en-US" dirty="0"/>
-              <a:t>10/14/2020</a:t>
+              <a:t>2/3/2021</a:t>
             </a:fld>
             <a:endParaRPr lang="en-US" dirty="0"/>
           </a:p>
@@ -2992,7 +2993,7 @@
           <a:p>
             <a:fld id="{48A87A34-81AB-432B-8DAE-1953F412C126}" type="datetimeFigureOut">
               <a:rPr lang="en-US" dirty="0"/>
-              <a:t>10/14/2020</a:t>
+              <a:t>2/3/2021</a:t>
             </a:fld>
             <a:endParaRPr lang="en-US" dirty="0"/>
           </a:p>
@@ -3192,7 +3193,7 @@
           <a:p>
             <a:fld id="{48A87A34-81AB-432B-8DAE-1953F412C126}" type="datetimeFigureOut">
               <a:rPr lang="en-US" dirty="0"/>
-              <a:t>10/14/2020</a:t>
+              <a:t>2/3/2021</a:t>
             </a:fld>
             <a:endParaRPr lang="en-US" dirty="0"/>
           </a:p>
@@ -3401,7 +3402,7 @@
           <a:p>
             <a:fld id="{48A87A34-81AB-432B-8DAE-1953F412C126}" type="datetimeFigureOut">
               <a:rPr lang="en-US" dirty="0"/>
-              <a:t>10/14/2020</a:t>
+              <a:t>2/3/2021</a:t>
             </a:fld>
             <a:endParaRPr lang="en-US" dirty="0"/>
           </a:p>
@@ -3601,7 +3602,7 @@
           <a:p>
             <a:fld id="{48A87A34-81AB-432B-8DAE-1953F412C126}" type="datetimeFigureOut">
               <a:rPr lang="en-US" dirty="0"/>
-              <a:t>10/14/2020</a:t>
+              <a:t>2/3/2021</a:t>
             </a:fld>
             <a:endParaRPr lang="en-US" dirty="0"/>
           </a:p>
@@ -3876,7 +3877,7 @@
           <a:p>
             <a:fld id="{48A87A34-81AB-432B-8DAE-1953F412C126}" type="datetimeFigureOut">
               <a:rPr lang="en-US" dirty="0"/>
-              <a:t>10/14/2020</a:t>
+              <a:t>2/3/2021</a:t>
             </a:fld>
             <a:endParaRPr lang="en-US" dirty="0"/>
           </a:p>
@@ -4138,7 +4139,7 @@
           <a:p>
             <a:fld id="{48A87A34-81AB-432B-8DAE-1953F412C126}" type="datetimeFigureOut">
               <a:rPr lang="en-US" dirty="0"/>
-              <a:t>10/14/2020</a:t>
+              <a:t>2/3/2021</a:t>
             </a:fld>
             <a:endParaRPr lang="en-US" dirty="0"/>
           </a:p>
@@ -4548,7 +4549,7 @@
           <a:p>
             <a:fld id="{48A87A34-81AB-432B-8DAE-1953F412C126}" type="datetimeFigureOut">
               <a:rPr lang="en-US" dirty="0"/>
-              <a:t>10/14/2020</a:t>
+              <a:t>2/3/2021</a:t>
             </a:fld>
             <a:endParaRPr lang="en-US" dirty="0"/>
           </a:p>
@@ -4691,7 +4692,7 @@
           <a:p>
             <a:fld id="{48A87A34-81AB-432B-8DAE-1953F412C126}" type="datetimeFigureOut">
               <a:rPr lang="en-US" dirty="0"/>
-              <a:t>10/14/2020</a:t>
+              <a:t>2/3/2021</a:t>
             </a:fld>
             <a:endParaRPr lang="en-US" dirty="0"/>
           </a:p>
@@ -4811,7 +4812,7 @@
           <a:p>
             <a:fld id="{48A87A34-81AB-432B-8DAE-1953F412C126}" type="datetimeFigureOut">
               <a:rPr lang="en-US" dirty="0"/>
-              <a:t>10/14/2020</a:t>
+              <a:t>2/3/2021</a:t>
             </a:fld>
             <a:endParaRPr lang="en-US" dirty="0"/>
           </a:p>
@@ -5085,7 +5086,7 @@
           <a:p>
             <a:fld id="{48A87A34-81AB-432B-8DAE-1953F412C126}" type="datetimeFigureOut">
               <a:rPr lang="en-US" dirty="0"/>
-              <a:t>10/14/2020</a:t>
+              <a:t>2/3/2021</a:t>
             </a:fld>
             <a:endParaRPr lang="en-US" dirty="0"/>
           </a:p>
@@ -5395,7 +5396,7 @@
           <a:p>
             <a:fld id="{48A87A34-81AB-432B-8DAE-1953F412C126}" type="datetimeFigureOut">
               <a:rPr lang="en-US" dirty="0"/>
-              <a:t>10/14/2020</a:t>
+              <a:t>2/3/2021</a:t>
             </a:fld>
             <a:endParaRPr lang="en-US" dirty="0"/>
           </a:p>
@@ -5644,7 +5645,7 @@
             <a:fld id="{48A87A34-81AB-432B-8DAE-1953F412C126}" type="datetimeFigureOut">
               <a:rPr lang="en-US" dirty="0"/>
               <a:pPr/>
-              <a:t>10/14/2020</a:t>
+              <a:t>2/3/2021</a:t>
             </a:fld>
             <a:endParaRPr lang="en-US" dirty="0"/>
           </a:p>
@@ -6142,7 +6143,15 @@
           <a:p>
             <a:r>
               <a:rPr lang="en-IN" dirty="0"/>
-              <a:t>Arunabh – LHL Sep Cohort East</a:t>
+              <a:t>Arunabh – </a:t>
+            </a:r>
+            <a:r>
+              <a:rPr lang="en-IN"/>
+              <a:t>LHL Jan 2021 </a:t>
+            </a:r>
+            <a:r>
+              <a:rPr lang="en-IN" dirty="0"/>
+              <a:t>Cohort East</a:t>
             </a:r>
           </a:p>
         </p:txBody>
@@ -6195,7 +6204,7 @@
         </p:nvSpPr>
         <p:spPr>
           <a:xfrm>
-            <a:off x="913774" y="235817"/>
+            <a:off x="913775" y="618517"/>
             <a:ext cx="10364451" cy="656101"/>
           </a:xfrm>
         </p:spPr>
@@ -6205,7 +6214,7 @@
           <a:p>
             <a:r>
               <a:rPr lang="en-IN" dirty="0"/>
-              <a:t>Entropy</a:t>
+              <a:t>GINI Calculations in the previous 3 examples</a:t>
             </a:r>
           </a:p>
         </p:txBody>
@@ -6246,57 +6255,12 @@
           </a:p>
         </p:txBody>
       </p:sp>
-      <p:sp>
-        <p:nvSpPr>
-          <p:cNvPr id="4" name="TextBox 3">
+      <p:pic>
+        <p:nvPicPr>
+          <p:cNvPr id="6" name="Picture 5">
             <a:extLst>
               <a:ext uri="{FF2B5EF4-FFF2-40B4-BE49-F238E27FC236}">
-                <a16:creationId xmlns:a16="http://schemas.microsoft.com/office/drawing/2014/main" id="{7E7F33BC-9AD5-4495-B82E-555CF58F9081}"/>
-              </a:ext>
-            </a:extLst>
-          </p:cNvPr>
-          <p:cNvSpPr txBox="1"/>
-          <p:nvPr/>
-        </p:nvSpPr>
-        <p:spPr>
-          <a:xfrm>
-            <a:off x="1256145" y="891918"/>
-            <a:ext cx="9910618" cy="369332"/>
-          </a:xfrm>
-          <a:prstGeom prst="rect">
-            <a:avLst/>
-          </a:prstGeom>
-          <a:noFill/>
-        </p:spPr>
-        <p:txBody>
-          <a:bodyPr wrap="square" rtlCol="0">
-            <a:spAutoFit/>
-          </a:bodyPr>
-          <a:lstStyle/>
-          <a:p>
-            <a:pPr marL="285750" indent="-285750">
-              <a:buFont typeface="Arial" panose="020B0604020202020204" pitchFamily="34" charset="0"/>
-              <a:buChar char="•"/>
-            </a:pPr>
-            <a:r>
-              <a:rPr lang="en-US" b="0" i="0" dirty="0">
-                <a:solidFill>
-                  <a:srgbClr val="292929"/>
-                </a:solidFill>
-                <a:effectLst/>
-                <a:latin typeface="medium-content-serif-font"/>
-              </a:rPr>
-              <a:t>Also used to measure the impurity or randomness of a dataset.</a:t>
-            </a:r>
-          </a:p>
-        </p:txBody>
-      </p:sp>
-      <p:pic>
-        <p:nvPicPr>
-          <p:cNvPr id="9" name="Picture 8">
-            <a:extLst>
-              <a:ext uri="{FF2B5EF4-FFF2-40B4-BE49-F238E27FC236}">
-                <a16:creationId xmlns:a16="http://schemas.microsoft.com/office/drawing/2014/main" id="{FEB19B0F-F977-463B-B067-43AC753D1C59}"/>
+                <a16:creationId xmlns:a16="http://schemas.microsoft.com/office/drawing/2014/main" id="{46B15514-08DC-46FB-81A0-8342FE731669}"/>
               </a:ext>
             </a:extLst>
           </p:cNvPr>
@@ -6313,201 +6277,78 @@
         </p:blipFill>
         <p:spPr>
           <a:xfrm>
-            <a:off x="1256145" y="1408720"/>
-            <a:ext cx="8115300" cy="2038350"/>
+            <a:off x="1219200" y="1505672"/>
+            <a:ext cx="8534400" cy="1356066"/>
           </a:xfrm>
           <a:prstGeom prst="rect">
             <a:avLst/>
           </a:prstGeom>
         </p:spPr>
       </p:pic>
-      <p:sp>
-        <p:nvSpPr>
-          <p:cNvPr id="11" name="TextBox 10">
+      <p:pic>
+        <p:nvPicPr>
+          <p:cNvPr id="7" name="Picture 6">
             <a:extLst>
               <a:ext uri="{FF2B5EF4-FFF2-40B4-BE49-F238E27FC236}">
-                <a16:creationId xmlns:a16="http://schemas.microsoft.com/office/drawing/2014/main" id="{92D716E3-05BA-4D3D-A65E-093752E8F75C}"/>
+                <a16:creationId xmlns:a16="http://schemas.microsoft.com/office/drawing/2014/main" id="{6B49D80B-374B-49F5-AE7A-659C5428A74D}"/>
               </a:ext>
             </a:extLst>
           </p:cNvPr>
-          <p:cNvSpPr txBox="1"/>
+          <p:cNvPicPr>
+            <a:picLocks noChangeAspect="1"/>
+          </p:cNvPicPr>
           <p:nvPr/>
-        </p:nvSpPr>
-        <p:spPr>
-          <a:xfrm>
-            <a:off x="1140690" y="3594540"/>
-            <a:ext cx="9910618" cy="3139321"/>
+        </p:nvPicPr>
+        <p:blipFill>
+          <a:blip r:embed="rId3"/>
+          <a:stretch>
+            <a:fillRect/>
+          </a:stretch>
+        </p:blipFill>
+        <p:spPr>
+          <a:xfrm>
+            <a:off x="1219198" y="3168269"/>
+            <a:ext cx="8534399" cy="1448377"/>
           </a:xfrm>
           <a:prstGeom prst="rect">
             <a:avLst/>
           </a:prstGeom>
-          <a:noFill/>
-        </p:spPr>
-        <p:txBody>
-          <a:bodyPr wrap="square" rtlCol="0">
-            <a:spAutoFit/>
-          </a:bodyPr>
-          <a:lstStyle/>
-          <a:p>
-            <a:pPr marL="285750" indent="-285750" algn="l">
-              <a:buFont typeface="Arial" panose="020B0604020202020204" pitchFamily="34" charset="0"/>
-              <a:buChar char="•"/>
-            </a:pPr>
-            <a:r>
-              <a:rPr lang="en-US" b="0" i="0" dirty="0">
-                <a:solidFill>
-                  <a:srgbClr val="292929"/>
-                </a:solidFill>
-                <a:effectLst/>
-                <a:latin typeface="medium-content-serif-font"/>
-              </a:rPr>
-              <a:t>Where P(x=k) is the probability that a target feature takes a specific value, k</a:t>
-            </a:r>
-          </a:p>
-          <a:p>
-            <a:pPr algn="l"/>
-            <a:endParaRPr lang="en-US" b="0" i="0" dirty="0">
-              <a:solidFill>
-                <a:srgbClr val="292929"/>
-              </a:solidFill>
-              <a:effectLst/>
-              <a:latin typeface="medium-content-serif-font"/>
-            </a:endParaRPr>
-          </a:p>
-          <a:p>
-            <a:pPr marL="285750" indent="-285750" algn="l">
-              <a:buFont typeface="Arial" panose="020B0604020202020204" pitchFamily="34" charset="0"/>
-              <a:buChar char="•"/>
-            </a:pPr>
-            <a:r>
-              <a:rPr lang="en-US" b="0" i="0" dirty="0">
-                <a:solidFill>
-                  <a:srgbClr val="292929"/>
-                </a:solidFill>
-                <a:effectLst/>
-                <a:latin typeface="medium-content-serif-font"/>
-              </a:rPr>
-              <a:t>Logarithm of fractions gives a negative value and hence a ‘-‘ sign is used in entropy formula to negate these negative values.</a:t>
-            </a:r>
-          </a:p>
-          <a:p>
-            <a:pPr algn="l"/>
-            <a:endParaRPr lang="en-US" b="0" i="0" dirty="0">
-              <a:solidFill>
-                <a:srgbClr val="292929"/>
-              </a:solidFill>
-              <a:effectLst/>
-              <a:latin typeface="medium-content-serif-font"/>
-            </a:endParaRPr>
-          </a:p>
-          <a:p>
-            <a:pPr marL="285750" indent="-285750">
-              <a:buFont typeface="Arial" panose="020B0604020202020204" pitchFamily="34" charset="0"/>
-              <a:buChar char="•"/>
-            </a:pPr>
-            <a:r>
-              <a:rPr lang="en-US" b="0" i="0" dirty="0">
-                <a:solidFill>
-                  <a:srgbClr val="292929"/>
-                </a:solidFill>
-                <a:effectLst/>
-                <a:latin typeface="medium-content-serif-font"/>
-              </a:rPr>
-              <a:t>The maximum value for entropy depends on the number of classes.</a:t>
-            </a:r>
-          </a:p>
-          <a:p>
-            <a:pPr marL="285750" indent="-285750">
-              <a:buFont typeface="Arial" panose="020B0604020202020204" pitchFamily="34" charset="0"/>
-              <a:buChar char="•"/>
-            </a:pPr>
-            <a:endParaRPr lang="en-US" dirty="0">
-              <a:solidFill>
-                <a:srgbClr val="292929"/>
-              </a:solidFill>
-              <a:latin typeface="medium-content-serif-font"/>
-            </a:endParaRPr>
-          </a:p>
-          <a:p>
-            <a:pPr marL="285750" indent="-285750">
-              <a:buFont typeface="Arial" panose="020B0604020202020204" pitchFamily="34" charset="0"/>
-              <a:buChar char="•"/>
-            </a:pPr>
-            <a:r>
-              <a:rPr lang="en-IN" b="0" i="0" dirty="0">
-                <a:solidFill>
-                  <a:srgbClr val="292929"/>
-                </a:solidFill>
-                <a:effectLst/>
-                <a:latin typeface="medium-content-serif-font"/>
-              </a:rPr>
-              <a:t>2 classes: Max entropy is 1. </a:t>
-            </a:r>
-            <a:r>
-              <a:rPr lang="en-IN" dirty="0">
-                <a:solidFill>
-                  <a:srgbClr val="292929"/>
-                </a:solidFill>
-                <a:latin typeface="medium-content-serif-font"/>
-              </a:rPr>
-              <a:t>4</a:t>
-            </a:r>
-            <a:r>
-              <a:rPr lang="en-IN" b="0" i="0" dirty="0">
-                <a:solidFill>
-                  <a:srgbClr val="292929"/>
-                </a:solidFill>
-                <a:effectLst/>
-                <a:latin typeface="medium-content-serif-font"/>
-              </a:rPr>
-              <a:t> classes: Max entropy is 2 and so on.</a:t>
-            </a:r>
-          </a:p>
-          <a:p>
-            <a:pPr marL="285750" indent="-285750">
-              <a:buFont typeface="Arial" panose="020B0604020202020204" pitchFamily="34" charset="0"/>
-              <a:buChar char="•"/>
-            </a:pPr>
-            <a:endParaRPr lang="en-IN" b="0" i="0" dirty="0">
-              <a:solidFill>
-                <a:srgbClr val="292929"/>
-              </a:solidFill>
-              <a:effectLst/>
-              <a:latin typeface="medium-content-serif-font"/>
-            </a:endParaRPr>
-          </a:p>
-          <a:p>
-            <a:pPr marL="285750" indent="-285750">
-              <a:buFont typeface="Arial" panose="020B0604020202020204" pitchFamily="34" charset="0"/>
-              <a:buChar char="•"/>
-            </a:pPr>
-            <a:endParaRPr lang="en-US" b="0" i="0" dirty="0">
-              <a:solidFill>
-                <a:srgbClr val="292929"/>
-              </a:solidFill>
-              <a:effectLst/>
-              <a:latin typeface="medium-content-serif-font"/>
-            </a:endParaRPr>
-          </a:p>
-          <a:p>
-            <a:pPr marL="285750" indent="-285750" algn="l">
-              <a:buFont typeface="Arial" panose="020B0604020202020204" pitchFamily="34" charset="0"/>
-              <a:buChar char="•"/>
-            </a:pPr>
-            <a:endParaRPr lang="en-US" b="0" i="0" dirty="0">
-              <a:solidFill>
-                <a:srgbClr val="292929"/>
-              </a:solidFill>
-              <a:effectLst/>
-              <a:latin typeface="medium-content-serif-font"/>
-            </a:endParaRPr>
-          </a:p>
-        </p:txBody>
-      </p:sp>
+        </p:spPr>
+      </p:pic>
+      <p:pic>
+        <p:nvPicPr>
+          <p:cNvPr id="8" name="Picture 7">
+            <a:extLst>
+              <a:ext uri="{FF2B5EF4-FFF2-40B4-BE49-F238E27FC236}">
+                <a16:creationId xmlns:a16="http://schemas.microsoft.com/office/drawing/2014/main" id="{2929F046-11CC-4688-B9BD-FF057AF5EE95}"/>
+              </a:ext>
+            </a:extLst>
+          </p:cNvPr>
+          <p:cNvPicPr>
+            <a:picLocks noChangeAspect="1"/>
+          </p:cNvPicPr>
+          <p:nvPr/>
+        </p:nvPicPr>
+        <p:blipFill>
+          <a:blip r:embed="rId4"/>
+          <a:stretch>
+            <a:fillRect/>
+          </a:stretch>
+        </p:blipFill>
+        <p:spPr>
+          <a:xfrm>
+            <a:off x="1219197" y="4923177"/>
+            <a:ext cx="8534399" cy="1419225"/>
+          </a:xfrm>
+          <a:prstGeom prst="rect">
+            <a:avLst/>
+          </a:prstGeom>
+        </p:spPr>
+      </p:pic>
     </p:spTree>
     <p:extLst>
       <p:ext uri="{BB962C8B-B14F-4D97-AF65-F5344CB8AC3E}">
-        <p14:creationId xmlns:p14="http://schemas.microsoft.com/office/powerpoint/2010/main" val="919805422"/>
+        <p14:creationId xmlns:p14="http://schemas.microsoft.com/office/powerpoint/2010/main" val="3718577835"/>
       </p:ext>
     </p:extLst>
   </p:cSld>
@@ -6539,7 +6380,7 @@
           <p:cNvPr id="2" name="Title 1">
             <a:extLst>
               <a:ext uri="{FF2B5EF4-FFF2-40B4-BE49-F238E27FC236}">
-                <a16:creationId xmlns:a16="http://schemas.microsoft.com/office/drawing/2014/main" id="{E8014FB8-C6CE-4078-B103-472418DA3FFF}"/>
+                <a16:creationId xmlns:a16="http://schemas.microsoft.com/office/drawing/2014/main" id="{10141CC6-6CEE-4A97-B1DA-1EF5CB69D511}"/>
               </a:ext>
             </a:extLst>
           </p:cNvPr>
@@ -6552,8 +6393,8 @@
         </p:nvSpPr>
         <p:spPr>
           <a:xfrm>
-            <a:off x="913773" y="184408"/>
-            <a:ext cx="10364451" cy="600683"/>
+            <a:off x="913774" y="235817"/>
+            <a:ext cx="10364451" cy="656101"/>
           </a:xfrm>
         </p:spPr>
         <p:txBody>
@@ -6562,17 +6403,98 @@
           <a:p>
             <a:r>
               <a:rPr lang="en-IN" dirty="0"/>
-              <a:t>ENTROPY EXAMPLE</a:t>
+              <a:t>Entropy</a:t>
+            </a:r>
+          </a:p>
+        </p:txBody>
+      </p:sp>
+      <p:sp>
+        <p:nvSpPr>
+          <p:cNvPr id="5" name="TextBox 4">
+            <a:extLst>
+              <a:ext uri="{FF2B5EF4-FFF2-40B4-BE49-F238E27FC236}">
+                <a16:creationId xmlns:a16="http://schemas.microsoft.com/office/drawing/2014/main" id="{3AB38BE7-E475-4B38-9DE9-FF7F6F7BB621}"/>
+              </a:ext>
+            </a:extLst>
+          </p:cNvPr>
+          <p:cNvSpPr txBox="1"/>
+          <p:nvPr/>
+        </p:nvSpPr>
+        <p:spPr>
+          <a:xfrm>
+            <a:off x="1782618" y="6371555"/>
+            <a:ext cx="8857672" cy="369332"/>
+          </a:xfrm>
+          <a:prstGeom prst="rect">
+            <a:avLst/>
+          </a:prstGeom>
+          <a:noFill/>
+        </p:spPr>
+        <p:txBody>
+          <a:bodyPr wrap="square">
+            <a:spAutoFit/>
+          </a:bodyPr>
+          <a:lstStyle/>
+          <a:p>
+            <a:pPr algn="ctr"/>
+            <a:r>
+              <a:rPr lang="en-IN" dirty="0"/>
+              <a:t>Source: https://towardsdatascience.com/gini-index-vs-information-entropy-7a7e4fed3fcb</a:t>
+            </a:r>
+          </a:p>
+        </p:txBody>
+      </p:sp>
+      <p:sp>
+        <p:nvSpPr>
+          <p:cNvPr id="4" name="TextBox 3">
+            <a:extLst>
+              <a:ext uri="{FF2B5EF4-FFF2-40B4-BE49-F238E27FC236}">
+                <a16:creationId xmlns:a16="http://schemas.microsoft.com/office/drawing/2014/main" id="{7E7F33BC-9AD5-4495-B82E-555CF58F9081}"/>
+              </a:ext>
+            </a:extLst>
+          </p:cNvPr>
+          <p:cNvSpPr txBox="1"/>
+          <p:nvPr/>
+        </p:nvSpPr>
+        <p:spPr>
+          <a:xfrm>
+            <a:off x="1256145" y="891918"/>
+            <a:ext cx="9910618" cy="369332"/>
+          </a:xfrm>
+          <a:prstGeom prst="rect">
+            <a:avLst/>
+          </a:prstGeom>
+          <a:noFill/>
+        </p:spPr>
+        <p:txBody>
+          <a:bodyPr wrap="square" rtlCol="0">
+            <a:spAutoFit/>
+          </a:bodyPr>
+          <a:lstStyle/>
+          <a:p>
+            <a:pPr marL="285750" indent="-285750">
+              <a:buFont typeface="Arial" panose="020B0604020202020204" pitchFamily="34" charset="0"/>
+              <a:buChar char="•"/>
+            </a:pPr>
+            <a:r>
+              <a:rPr lang="en-US" b="0" i="0" dirty="0">
+                <a:solidFill>
+                  <a:srgbClr val="292929"/>
+                </a:solidFill>
+                <a:effectLst/>
+                <a:latin typeface="medium-content-serif-font"/>
+              </a:rPr>
+              <a:t>Also used to measure the impurity or randomness of a dataset.</a:t>
             </a:r>
           </a:p>
         </p:txBody>
       </p:sp>
       <p:pic>
         <p:nvPicPr>
-          <p:cNvPr id="4" name="Picture 3">
+          <p:cNvPr id="9" name="Picture 8">
             <a:extLst>
               <a:ext uri="{FF2B5EF4-FFF2-40B4-BE49-F238E27FC236}">
-                <a16:creationId xmlns:a16="http://schemas.microsoft.com/office/drawing/2014/main" id="{82B83744-3E8A-4CAE-814B-C5BB15CBB0DB}"/>
+                <a16:creationId xmlns:a16="http://schemas.microsoft.com/office/drawing/2014/main" id="{FEB19B0F-F977-463B-B067-43AC753D1C59}"/>
               </a:ext>
             </a:extLst>
           </p:cNvPr>
@@ -6589,48 +6511,201 @@
         </p:blipFill>
         <p:spPr>
           <a:xfrm>
-            <a:off x="1032597" y="882361"/>
-            <a:ext cx="10522094" cy="2396548"/>
+            <a:off x="1256145" y="1408720"/>
+            <a:ext cx="8115300" cy="2038350"/>
           </a:xfrm>
           <a:prstGeom prst="rect">
             <a:avLst/>
           </a:prstGeom>
         </p:spPr>
       </p:pic>
-      <p:pic>
-        <p:nvPicPr>
-          <p:cNvPr id="5" name="Picture 4">
+      <p:sp>
+        <p:nvSpPr>
+          <p:cNvPr id="11" name="TextBox 10">
             <a:extLst>
               <a:ext uri="{FF2B5EF4-FFF2-40B4-BE49-F238E27FC236}">
-                <a16:creationId xmlns:a16="http://schemas.microsoft.com/office/drawing/2014/main" id="{E74B7DCD-3B96-46AF-BF80-DDE3D3A0A55D}"/>
+                <a16:creationId xmlns:a16="http://schemas.microsoft.com/office/drawing/2014/main" id="{92D716E3-05BA-4D3D-A65E-093752E8F75C}"/>
               </a:ext>
             </a:extLst>
           </p:cNvPr>
-          <p:cNvPicPr>
-            <a:picLocks noChangeAspect="1"/>
-          </p:cNvPicPr>
+          <p:cNvSpPr txBox="1"/>
           <p:nvPr/>
-        </p:nvPicPr>
-        <p:blipFill>
-          <a:blip r:embed="rId3"/>
-          <a:stretch>
-            <a:fillRect/>
-          </a:stretch>
-        </p:blipFill>
-        <p:spPr>
-          <a:xfrm>
-            <a:off x="1032597" y="3461904"/>
-            <a:ext cx="10522094" cy="3057525"/>
+        </p:nvSpPr>
+        <p:spPr>
+          <a:xfrm>
+            <a:off x="1140690" y="3594540"/>
+            <a:ext cx="9910618" cy="3139321"/>
           </a:xfrm>
           <a:prstGeom prst="rect">
             <a:avLst/>
           </a:prstGeom>
-        </p:spPr>
-      </p:pic>
+          <a:noFill/>
+        </p:spPr>
+        <p:txBody>
+          <a:bodyPr wrap="square" rtlCol="0">
+            <a:spAutoFit/>
+          </a:bodyPr>
+          <a:lstStyle/>
+          <a:p>
+            <a:pPr marL="285750" indent="-285750" algn="l">
+              <a:buFont typeface="Arial" panose="020B0604020202020204" pitchFamily="34" charset="0"/>
+              <a:buChar char="•"/>
+            </a:pPr>
+            <a:r>
+              <a:rPr lang="en-US" b="0" i="0" dirty="0">
+                <a:solidFill>
+                  <a:srgbClr val="292929"/>
+                </a:solidFill>
+                <a:effectLst/>
+                <a:latin typeface="medium-content-serif-font"/>
+              </a:rPr>
+              <a:t>Where P(x=k) is the probability that a target feature takes a specific value, k</a:t>
+            </a:r>
+          </a:p>
+          <a:p>
+            <a:pPr algn="l"/>
+            <a:endParaRPr lang="en-US" b="0" i="0" dirty="0">
+              <a:solidFill>
+                <a:srgbClr val="292929"/>
+              </a:solidFill>
+              <a:effectLst/>
+              <a:latin typeface="medium-content-serif-font"/>
+            </a:endParaRPr>
+          </a:p>
+          <a:p>
+            <a:pPr marL="285750" indent="-285750" algn="l">
+              <a:buFont typeface="Arial" panose="020B0604020202020204" pitchFamily="34" charset="0"/>
+              <a:buChar char="•"/>
+            </a:pPr>
+            <a:r>
+              <a:rPr lang="en-US" b="0" i="0" dirty="0">
+                <a:solidFill>
+                  <a:srgbClr val="292929"/>
+                </a:solidFill>
+                <a:effectLst/>
+                <a:latin typeface="medium-content-serif-font"/>
+              </a:rPr>
+              <a:t>Logarithm of fractions gives a negative value and hence a ‘-‘ sign is used in entropy formula to negate these negative values.</a:t>
+            </a:r>
+          </a:p>
+          <a:p>
+            <a:pPr algn="l"/>
+            <a:endParaRPr lang="en-US" b="0" i="0" dirty="0">
+              <a:solidFill>
+                <a:srgbClr val="292929"/>
+              </a:solidFill>
+              <a:effectLst/>
+              <a:latin typeface="medium-content-serif-font"/>
+            </a:endParaRPr>
+          </a:p>
+          <a:p>
+            <a:pPr marL="285750" indent="-285750">
+              <a:buFont typeface="Arial" panose="020B0604020202020204" pitchFamily="34" charset="0"/>
+              <a:buChar char="•"/>
+            </a:pPr>
+            <a:r>
+              <a:rPr lang="en-US" b="0" i="0" dirty="0">
+                <a:solidFill>
+                  <a:srgbClr val="292929"/>
+                </a:solidFill>
+                <a:effectLst/>
+                <a:latin typeface="medium-content-serif-font"/>
+              </a:rPr>
+              <a:t>The maximum value for entropy depends on the number of classes.</a:t>
+            </a:r>
+          </a:p>
+          <a:p>
+            <a:pPr marL="285750" indent="-285750">
+              <a:buFont typeface="Arial" panose="020B0604020202020204" pitchFamily="34" charset="0"/>
+              <a:buChar char="•"/>
+            </a:pPr>
+            <a:endParaRPr lang="en-US" dirty="0">
+              <a:solidFill>
+                <a:srgbClr val="292929"/>
+              </a:solidFill>
+              <a:latin typeface="medium-content-serif-font"/>
+            </a:endParaRPr>
+          </a:p>
+          <a:p>
+            <a:pPr marL="285750" indent="-285750">
+              <a:buFont typeface="Arial" panose="020B0604020202020204" pitchFamily="34" charset="0"/>
+              <a:buChar char="•"/>
+            </a:pPr>
+            <a:r>
+              <a:rPr lang="en-IN" b="0" i="0" dirty="0">
+                <a:solidFill>
+                  <a:srgbClr val="292929"/>
+                </a:solidFill>
+                <a:effectLst/>
+                <a:latin typeface="medium-content-serif-font"/>
+              </a:rPr>
+              <a:t>2 classes: Max entropy is 1. </a:t>
+            </a:r>
+            <a:r>
+              <a:rPr lang="en-IN" dirty="0">
+                <a:solidFill>
+                  <a:srgbClr val="292929"/>
+                </a:solidFill>
+                <a:latin typeface="medium-content-serif-font"/>
+              </a:rPr>
+              <a:t>4</a:t>
+            </a:r>
+            <a:r>
+              <a:rPr lang="en-IN" b="0" i="0" dirty="0">
+                <a:solidFill>
+                  <a:srgbClr val="292929"/>
+                </a:solidFill>
+                <a:effectLst/>
+                <a:latin typeface="medium-content-serif-font"/>
+              </a:rPr>
+              <a:t> classes: Max entropy is 2 and so on.</a:t>
+            </a:r>
+          </a:p>
+          <a:p>
+            <a:pPr marL="285750" indent="-285750">
+              <a:buFont typeface="Arial" panose="020B0604020202020204" pitchFamily="34" charset="0"/>
+              <a:buChar char="•"/>
+            </a:pPr>
+            <a:endParaRPr lang="en-IN" b="0" i="0" dirty="0">
+              <a:solidFill>
+                <a:srgbClr val="292929"/>
+              </a:solidFill>
+              <a:effectLst/>
+              <a:latin typeface="medium-content-serif-font"/>
+            </a:endParaRPr>
+          </a:p>
+          <a:p>
+            <a:pPr marL="285750" indent="-285750">
+              <a:buFont typeface="Arial" panose="020B0604020202020204" pitchFamily="34" charset="0"/>
+              <a:buChar char="•"/>
+            </a:pPr>
+            <a:endParaRPr lang="en-US" b="0" i="0" dirty="0">
+              <a:solidFill>
+                <a:srgbClr val="292929"/>
+              </a:solidFill>
+              <a:effectLst/>
+              <a:latin typeface="medium-content-serif-font"/>
+            </a:endParaRPr>
+          </a:p>
+          <a:p>
+            <a:pPr marL="285750" indent="-285750" algn="l">
+              <a:buFont typeface="Arial" panose="020B0604020202020204" pitchFamily="34" charset="0"/>
+              <a:buChar char="•"/>
+            </a:pPr>
+            <a:endParaRPr lang="en-US" b="0" i="0" dirty="0">
+              <a:solidFill>
+                <a:srgbClr val="292929"/>
+              </a:solidFill>
+              <a:effectLst/>
+              <a:latin typeface="medium-content-serif-font"/>
+            </a:endParaRPr>
+          </a:p>
+        </p:txBody>
+      </p:sp>
     </p:spTree>
     <p:extLst>
       <p:ext uri="{BB962C8B-B14F-4D97-AF65-F5344CB8AC3E}">
-        <p14:creationId xmlns:p14="http://schemas.microsoft.com/office/powerpoint/2010/main" val="2485239305"/>
+        <p14:creationId xmlns:p14="http://schemas.microsoft.com/office/powerpoint/2010/main" val="919805422"/>
       </p:ext>
     </p:extLst>
   </p:cSld>
@@ -6662,7 +6737,7 @@
           <p:cNvPr id="2" name="Title 1">
             <a:extLst>
               <a:ext uri="{FF2B5EF4-FFF2-40B4-BE49-F238E27FC236}">
-                <a16:creationId xmlns:a16="http://schemas.microsoft.com/office/drawing/2014/main" id="{1AA20A2F-636F-4EE8-85F6-991550A07FAF}"/>
+                <a16:creationId xmlns:a16="http://schemas.microsoft.com/office/drawing/2014/main" id="{E8014FB8-C6CE-4078-B103-472418DA3FFF}"/>
               </a:ext>
             </a:extLst>
           </p:cNvPr>
@@ -6675,272 +6750,85 @@
         </p:nvSpPr>
         <p:spPr>
           <a:xfrm>
-            <a:off x="913774" y="268712"/>
-            <a:ext cx="10364451" cy="525615"/>
-          </a:xfrm>
-        </p:spPr>
-        <p:txBody>
-          <a:bodyPr>
-            <a:normAutofit fontScale="90000"/>
-          </a:bodyPr>
+            <a:off x="913773" y="184408"/>
+            <a:ext cx="10364451" cy="600683"/>
+          </a:xfrm>
+        </p:spPr>
+        <p:txBody>
+          <a:bodyPr/>
           <a:lstStyle/>
           <a:p>
             <a:r>
               <a:rPr lang="en-IN" dirty="0"/>
-              <a:t>Advantages and disadvantages of decision trees</a:t>
-            </a:r>
-          </a:p>
-        </p:txBody>
-      </p:sp>
-      <p:sp>
-        <p:nvSpPr>
-          <p:cNvPr id="3" name="Content Placeholder 2">
+              <a:t>ENTROPY EXAMPLE</a:t>
+            </a:r>
+          </a:p>
+        </p:txBody>
+      </p:sp>
+      <p:pic>
+        <p:nvPicPr>
+          <p:cNvPr id="4" name="Picture 3">
             <a:extLst>
               <a:ext uri="{FF2B5EF4-FFF2-40B4-BE49-F238E27FC236}">
-                <a16:creationId xmlns:a16="http://schemas.microsoft.com/office/drawing/2014/main" id="{3945F0C5-1B74-459A-9980-FB5B523FE3CA}"/>
+                <a16:creationId xmlns:a16="http://schemas.microsoft.com/office/drawing/2014/main" id="{82B83744-3E8A-4CAE-814B-C5BB15CBB0DB}"/>
               </a:ext>
             </a:extLst>
           </p:cNvPr>
-          <p:cNvSpPr>
-            <a:spLocks noGrp="1"/>
-          </p:cNvSpPr>
-          <p:nvPr>
-            <p:ph sz="quarter" idx="13"/>
-          </p:nvPr>
-        </p:nvSpPr>
-        <p:spPr>
-          <a:xfrm>
-            <a:off x="1144683" y="794327"/>
-            <a:ext cx="10363826" cy="5394037"/>
-          </a:xfrm>
-        </p:spPr>
-        <p:txBody>
-          <a:bodyPr>
-            <a:normAutofit/>
-          </a:bodyPr>
-          <a:lstStyle/>
-          <a:p>
-            <a:pPr algn="l">
-              <a:buFont typeface="Arial" panose="020B0604020202020204" pitchFamily="34" charset="0"/>
-              <a:buChar char="•"/>
-            </a:pPr>
-            <a:r>
-              <a:rPr lang="en-US" sz="1600" b="1" i="0" dirty="0">
-                <a:solidFill>
-                  <a:srgbClr val="333333"/>
-                </a:solidFill>
-                <a:effectLst/>
-                <a:latin typeface="roboto"/>
-              </a:rPr>
-              <a:t>Easy to visualize and interpret</a:t>
-            </a:r>
-            <a:r>
-              <a:rPr lang="en-US" sz="1600" b="0" i="0" dirty="0">
-                <a:solidFill>
-                  <a:srgbClr val="595858"/>
-                </a:solidFill>
-                <a:effectLst/>
-                <a:latin typeface="roboto"/>
-              </a:rPr>
-              <a:t>: Its graphical representation is very intuitive to understand and it does not require any knowledge of statistics to interpret it.</a:t>
-            </a:r>
-          </a:p>
-          <a:p>
-            <a:pPr algn="l">
-              <a:buFont typeface="Arial" panose="020B0604020202020204" pitchFamily="34" charset="0"/>
-              <a:buChar char="•"/>
-            </a:pPr>
-            <a:r>
-              <a:rPr lang="en-US" sz="1600" b="1" i="0" dirty="0">
-                <a:solidFill>
-                  <a:srgbClr val="333333"/>
-                </a:solidFill>
-                <a:effectLst/>
-                <a:latin typeface="roboto"/>
-              </a:rPr>
-              <a:t>Useful in data exploration</a:t>
-            </a:r>
-            <a:r>
-              <a:rPr lang="en-US" sz="1600" b="0" i="0" dirty="0">
-                <a:solidFill>
-                  <a:srgbClr val="595858"/>
-                </a:solidFill>
-                <a:effectLst/>
-                <a:latin typeface="roboto"/>
-              </a:rPr>
-              <a:t>: We can easily identify the most significant variable and the relation between variables with a decision tree. It can help us create new variables or put some features in one bucket.</a:t>
-            </a:r>
-          </a:p>
-          <a:p>
-            <a:pPr algn="l">
-              <a:buFont typeface="Arial" panose="020B0604020202020204" pitchFamily="34" charset="0"/>
-              <a:buChar char="•"/>
-            </a:pPr>
-            <a:r>
-              <a:rPr lang="en-US" sz="1600" b="1" i="0" dirty="0">
-                <a:solidFill>
-                  <a:srgbClr val="333333"/>
-                </a:solidFill>
-                <a:effectLst/>
-                <a:latin typeface="roboto"/>
-              </a:rPr>
-              <a:t>Less data cleaning required</a:t>
-            </a:r>
-            <a:r>
-              <a:rPr lang="en-US" sz="1600" b="0" i="0" dirty="0">
-                <a:solidFill>
-                  <a:srgbClr val="595858"/>
-                </a:solidFill>
-                <a:effectLst/>
-                <a:latin typeface="roboto"/>
-              </a:rPr>
-              <a:t>: It is fairly immune to outliers and missing data, hence less data cleaning is needed.</a:t>
-            </a:r>
-          </a:p>
-          <a:p>
-            <a:pPr algn="l">
-              <a:buFont typeface="Arial" panose="020B0604020202020204" pitchFamily="34" charset="0"/>
-              <a:buChar char="•"/>
-            </a:pPr>
-            <a:r>
-              <a:rPr lang="en-US" sz="1600" b="1" i="0" dirty="0">
-                <a:solidFill>
-                  <a:srgbClr val="333333"/>
-                </a:solidFill>
-                <a:effectLst/>
-                <a:latin typeface="roboto"/>
-              </a:rPr>
-              <a:t>The data type is not a constraint</a:t>
-            </a:r>
-            <a:r>
-              <a:rPr lang="en-US" sz="1600" b="0" i="0" dirty="0">
-                <a:solidFill>
-                  <a:srgbClr val="595858"/>
-                </a:solidFill>
-                <a:effectLst/>
-                <a:latin typeface="roboto"/>
-              </a:rPr>
-              <a:t>: It can handle both categorical and numerical data.</a:t>
-            </a:r>
-          </a:p>
-          <a:p>
-            <a:endParaRPr lang="en-IN" sz="1800" b="1" dirty="0">
-              <a:solidFill>
-                <a:srgbClr val="FF0000"/>
-              </a:solidFill>
-              <a:latin typeface="medium-content-serif-font"/>
-            </a:endParaRPr>
-          </a:p>
-          <a:p>
-            <a:pPr algn="l">
-              <a:buFont typeface="Arial" panose="020B0604020202020204" pitchFamily="34" charset="0"/>
-              <a:buChar char="•"/>
-            </a:pPr>
-            <a:r>
-              <a:rPr lang="en-US" sz="1600" b="1" i="0" dirty="0">
-                <a:solidFill>
-                  <a:srgbClr val="FF0000"/>
-                </a:solidFill>
-                <a:effectLst/>
-                <a:latin typeface="roboto"/>
-              </a:rPr>
-              <a:t>Overfitting</a:t>
-            </a:r>
-            <a:r>
-              <a:rPr lang="en-US" sz="1600" b="0" i="0" dirty="0">
-                <a:solidFill>
-                  <a:srgbClr val="FF0000"/>
-                </a:solidFill>
-                <a:effectLst/>
-                <a:latin typeface="roboto"/>
-              </a:rPr>
-              <a:t>: single decision tree tends to overfit the data which is solved by setting constraints on model parameters i.e. height of the tree and pruning.</a:t>
-            </a:r>
-          </a:p>
-          <a:p>
-            <a:pPr algn="l">
-              <a:buFont typeface="Arial" panose="020B0604020202020204" pitchFamily="34" charset="0"/>
-              <a:buChar char="•"/>
-            </a:pPr>
-            <a:r>
-              <a:rPr lang="en-US" sz="1600" b="1" i="0" dirty="0">
-                <a:solidFill>
-                  <a:srgbClr val="FF0000"/>
-                </a:solidFill>
-                <a:effectLst/>
-                <a:latin typeface="roboto"/>
-              </a:rPr>
-              <a:t>Not exact fit for continuous data</a:t>
-            </a:r>
-            <a:r>
-              <a:rPr lang="en-US" sz="1600" b="0" i="0" dirty="0">
-                <a:solidFill>
-                  <a:srgbClr val="FF0000"/>
-                </a:solidFill>
-                <a:effectLst/>
-                <a:latin typeface="roboto"/>
-              </a:rPr>
-              <a:t>: It losses some of the information associated with numerical variables when it classifies them into different categories.</a:t>
-            </a:r>
-          </a:p>
-          <a:p>
-            <a:endParaRPr lang="en-IN" sz="1800" b="1" dirty="0">
-              <a:solidFill>
-                <a:srgbClr val="292929"/>
-              </a:solidFill>
-              <a:latin typeface="medium-content-serif-font"/>
-            </a:endParaRPr>
-          </a:p>
-          <a:p>
-            <a:endParaRPr lang="en-IN" sz="1800" b="1" dirty="0">
-              <a:solidFill>
-                <a:srgbClr val="292929"/>
-              </a:solidFill>
-              <a:latin typeface="medium-content-serif-font"/>
-            </a:endParaRPr>
-          </a:p>
-        </p:txBody>
-      </p:sp>
-      <p:sp>
-        <p:nvSpPr>
-          <p:cNvPr id="5" name="TextBox 4">
+          <p:cNvPicPr>
+            <a:picLocks noChangeAspect="1"/>
+          </p:cNvPicPr>
+          <p:nvPr/>
+        </p:nvPicPr>
+        <p:blipFill>
+          <a:blip r:embed="rId2"/>
+          <a:stretch>
+            <a:fillRect/>
+          </a:stretch>
+        </p:blipFill>
+        <p:spPr>
+          <a:xfrm>
+            <a:off x="1032597" y="882361"/>
+            <a:ext cx="10522094" cy="2396548"/>
+          </a:xfrm>
+          <a:prstGeom prst="rect">
+            <a:avLst/>
+          </a:prstGeom>
+        </p:spPr>
+      </p:pic>
+      <p:pic>
+        <p:nvPicPr>
+          <p:cNvPr id="5" name="Picture 4">
             <a:extLst>
               <a:ext uri="{FF2B5EF4-FFF2-40B4-BE49-F238E27FC236}">
-                <a16:creationId xmlns:a16="http://schemas.microsoft.com/office/drawing/2014/main" id="{173BCDFB-D695-4CC4-AA6D-B402A6DF631A}"/>
+                <a16:creationId xmlns:a16="http://schemas.microsoft.com/office/drawing/2014/main" id="{E74B7DCD-3B96-46AF-BF80-DDE3D3A0A55D}"/>
               </a:ext>
             </a:extLst>
           </p:cNvPr>
-          <p:cNvSpPr txBox="1"/>
+          <p:cNvPicPr>
+            <a:picLocks noChangeAspect="1"/>
+          </p:cNvPicPr>
           <p:nvPr/>
-        </p:nvSpPr>
-        <p:spPr>
-          <a:xfrm>
-            <a:off x="1782618" y="6371555"/>
-            <a:ext cx="8857672" cy="369332"/>
+        </p:nvPicPr>
+        <p:blipFill>
+          <a:blip r:embed="rId3"/>
+          <a:stretch>
+            <a:fillRect/>
+          </a:stretch>
+        </p:blipFill>
+        <p:spPr>
+          <a:xfrm>
+            <a:off x="1032597" y="3461904"/>
+            <a:ext cx="10522094" cy="3057525"/>
           </a:xfrm>
           <a:prstGeom prst="rect">
             <a:avLst/>
           </a:prstGeom>
-          <a:noFill/>
-        </p:spPr>
-        <p:txBody>
-          <a:bodyPr wrap="square">
-            <a:spAutoFit/>
-          </a:bodyPr>
-          <a:lstStyle/>
-          <a:p>
-            <a:pPr algn="ctr"/>
-            <a:r>
-              <a:rPr lang="en-IN" dirty="0"/>
-              <a:t>Source: Analytics Vidhya</a:t>
-            </a:r>
-          </a:p>
-        </p:txBody>
-      </p:sp>
+        </p:spPr>
+      </p:pic>
     </p:spTree>
     <p:extLst>
       <p:ext uri="{BB962C8B-B14F-4D97-AF65-F5344CB8AC3E}">
-        <p14:creationId xmlns:p14="http://schemas.microsoft.com/office/powerpoint/2010/main" val="2321707161"/>
+        <p14:creationId xmlns:p14="http://schemas.microsoft.com/office/powerpoint/2010/main" val="2485239305"/>
       </p:ext>
     </p:extLst>
   </p:cSld>
@@ -6972,7 +6860,7 @@
           <p:cNvPr id="2" name="Title 1">
             <a:extLst>
               <a:ext uri="{FF2B5EF4-FFF2-40B4-BE49-F238E27FC236}">
-                <a16:creationId xmlns:a16="http://schemas.microsoft.com/office/drawing/2014/main" id="{2E722728-C213-45CF-81EE-B0A0DC4C3076}"/>
+                <a16:creationId xmlns:a16="http://schemas.microsoft.com/office/drawing/2014/main" id="{1AA20A2F-636F-4EE8-85F6-991550A07FAF}"/>
               </a:ext>
             </a:extLst>
           </p:cNvPr>
@@ -6985,17 +6873,19 @@
         </p:nvSpPr>
         <p:spPr>
           <a:xfrm>
-            <a:off x="978429" y="193645"/>
-            <a:ext cx="10364451" cy="609920"/>
-          </a:xfrm>
-        </p:spPr>
-        <p:txBody>
-          <a:bodyPr/>
+            <a:off x="913774" y="268712"/>
+            <a:ext cx="10364451" cy="525615"/>
+          </a:xfrm>
+        </p:spPr>
+        <p:txBody>
+          <a:bodyPr>
+            <a:normAutofit fontScale="90000"/>
+          </a:bodyPr>
           <a:lstStyle/>
           <a:p>
             <a:r>
               <a:rPr lang="en-IN" dirty="0"/>
-              <a:t>Problems with decision trees</a:t>
+              <a:t>Advantages and disadvantages of decision trees</a:t>
             </a:r>
           </a:p>
         </p:txBody>
@@ -7005,7 +6895,7 @@
           <p:cNvPr id="3" name="Content Placeholder 2">
             <a:extLst>
               <a:ext uri="{FF2B5EF4-FFF2-40B4-BE49-F238E27FC236}">
-                <a16:creationId xmlns:a16="http://schemas.microsoft.com/office/drawing/2014/main" id="{355E0A12-0DCA-4CD0-9134-284C60A0F35D}"/>
+                <a16:creationId xmlns:a16="http://schemas.microsoft.com/office/drawing/2014/main" id="{3945F0C5-1B74-459A-9980-FB5B523FE3CA}"/>
               </a:ext>
             </a:extLst>
           </p:cNvPr>
@@ -7018,58 +6908,237 @@
         </p:nvSpPr>
         <p:spPr>
           <a:xfrm>
-            <a:off x="1052320" y="944692"/>
-            <a:ext cx="10363826" cy="4061417"/>
-          </a:xfrm>
-        </p:spPr>
-        <p:txBody>
-          <a:bodyPr/>
-          <a:lstStyle/>
-          <a:p>
+            <a:off x="1144683" y="794327"/>
+            <a:ext cx="10363826" cy="5394037"/>
+          </a:xfrm>
+        </p:spPr>
+        <p:txBody>
+          <a:bodyPr>
+            <a:normAutofit/>
+          </a:bodyPr>
+          <a:lstStyle/>
+          <a:p>
+            <a:pPr algn="l">
+              <a:buFont typeface="Arial" panose="020B0604020202020204" pitchFamily="34" charset="0"/>
+              <a:buChar char="•"/>
+            </a:pPr>
+            <a:r>
+              <a:rPr lang="en-US" sz="1600" b="1" i="0" dirty="0">
+                <a:solidFill>
+                  <a:srgbClr val="333333"/>
+                </a:solidFill>
+                <a:effectLst/>
+                <a:latin typeface="roboto"/>
+              </a:rPr>
+              <a:t>Easy to visualize and interpret</a:t>
+            </a:r>
+            <a:r>
+              <a:rPr lang="en-US" sz="1600" b="0" i="0" dirty="0">
+                <a:solidFill>
+                  <a:srgbClr val="595858"/>
+                </a:solidFill>
+                <a:effectLst/>
+                <a:latin typeface="roboto"/>
+              </a:rPr>
+              <a:t>: Its graphical representation is very intuitive to understand and it does not require any knowledge of statistics to interpret it.</a:t>
+            </a:r>
+          </a:p>
+          <a:p>
+            <a:pPr algn="l">
+              <a:buFont typeface="Arial" panose="020B0604020202020204" pitchFamily="34" charset="0"/>
+              <a:buChar char="•"/>
+            </a:pPr>
+            <a:r>
+              <a:rPr lang="en-US" sz="1600" b="1" i="0" dirty="0">
+                <a:solidFill>
+                  <a:srgbClr val="333333"/>
+                </a:solidFill>
+                <a:effectLst/>
+                <a:latin typeface="roboto"/>
+              </a:rPr>
+              <a:t>Useful in data exploration</a:t>
+            </a:r>
+            <a:r>
+              <a:rPr lang="en-US" sz="1600" b="0" i="0" dirty="0">
+                <a:solidFill>
+                  <a:srgbClr val="595858"/>
+                </a:solidFill>
+                <a:effectLst/>
+                <a:latin typeface="roboto"/>
+              </a:rPr>
+              <a:t>: We can easily identify the most significant variable and the relation between variables with a decision tree. It can help us create new variables or put some features in one bucket.</a:t>
+            </a:r>
+          </a:p>
+          <a:p>
+            <a:pPr algn="l">
+              <a:buFont typeface="Arial" panose="020B0604020202020204" pitchFamily="34" charset="0"/>
+              <a:buChar char="•"/>
+            </a:pPr>
+            <a:r>
+              <a:rPr lang="en-US" sz="1600" b="1" i="0" dirty="0">
+                <a:solidFill>
+                  <a:srgbClr val="333333"/>
+                </a:solidFill>
+                <a:effectLst/>
+                <a:latin typeface="roboto"/>
+              </a:rPr>
+              <a:t>Less data cleaning required</a:t>
+            </a:r>
+            <a:r>
+              <a:rPr lang="en-US" sz="1600" b="0" i="0" dirty="0">
+                <a:solidFill>
+                  <a:srgbClr val="595858"/>
+                </a:solidFill>
+                <a:effectLst/>
+                <a:latin typeface="roboto"/>
+              </a:rPr>
+              <a:t>: It is fairly immune to outliers and missing data, hence less data cleaning is needed.</a:t>
+            </a:r>
+          </a:p>
+          <a:p>
+            <a:pPr algn="l">
+              <a:buFont typeface="Arial" panose="020B0604020202020204" pitchFamily="34" charset="0"/>
+              <a:buChar char="•"/>
+            </a:pPr>
+            <a:r>
+              <a:rPr lang="en-US" sz="1600" b="1" i="0" dirty="0">
+                <a:solidFill>
+                  <a:srgbClr val="333333"/>
+                </a:solidFill>
+                <a:effectLst/>
+                <a:latin typeface="roboto"/>
+              </a:rPr>
+              <a:t>The data type is not a constraint</a:t>
+            </a:r>
+            <a:r>
+              <a:rPr lang="en-US" sz="1600" b="0" i="0" dirty="0">
+                <a:solidFill>
+                  <a:srgbClr val="595858"/>
+                </a:solidFill>
+                <a:effectLst/>
+                <a:latin typeface="roboto"/>
+              </a:rPr>
+              <a:t>: It can handle both categorical and numerical data.</a:t>
+            </a:r>
+          </a:p>
+          <a:p>
+            <a:endParaRPr lang="en-IN" sz="1800" b="1" dirty="0">
+              <a:solidFill>
+                <a:srgbClr val="FF0000"/>
+              </a:solidFill>
+              <a:latin typeface="medium-content-serif-font"/>
+            </a:endParaRPr>
+          </a:p>
+          <a:p>
+            <a:pPr algn="l">
+              <a:buFont typeface="Arial" panose="020B0604020202020204" pitchFamily="34" charset="0"/>
+              <a:buChar char="•"/>
+            </a:pPr>
+            <a:r>
+              <a:rPr lang="en-US" sz="1600" b="1" i="0" dirty="0">
+                <a:solidFill>
+                  <a:srgbClr val="FF0000"/>
+                </a:solidFill>
+                <a:effectLst/>
+                <a:latin typeface="roboto"/>
+              </a:rPr>
+              <a:t>Overfitting</a:t>
+            </a:r>
+            <a:r>
+              <a:rPr lang="en-US" sz="1600" b="0" i="0" dirty="0">
+                <a:solidFill>
+                  <a:srgbClr val="FF0000"/>
+                </a:solidFill>
+                <a:effectLst/>
+                <a:latin typeface="roboto"/>
+              </a:rPr>
+              <a:t>: single decision tree tends to overfit the data which is solved by setting constraints on model parameters i.e. height of the tree and pruning.</a:t>
+            </a:r>
+          </a:p>
+          <a:p>
+            <a:pPr algn="l">
+              <a:buFont typeface="Arial" panose="020B0604020202020204" pitchFamily="34" charset="0"/>
+              <a:buChar char="•"/>
+            </a:pPr>
+            <a:r>
+              <a:rPr lang="en-US" sz="1600" b="1" i="0" dirty="0">
+                <a:solidFill>
+                  <a:srgbClr val="FF0000"/>
+                </a:solidFill>
+                <a:effectLst/>
+                <a:latin typeface="roboto"/>
+              </a:rPr>
+              <a:t>Not exact fit for continuous data</a:t>
+            </a:r>
+            <a:r>
+              <a:rPr lang="en-US" sz="1600" b="0" i="0" dirty="0">
+                <a:solidFill>
+                  <a:srgbClr val="FF0000"/>
+                </a:solidFill>
+                <a:effectLst/>
+                <a:latin typeface="roboto"/>
+              </a:rPr>
+              <a:t>: It losses some of the information associated with numerical variables when it classifies them into different categories.</a:t>
+            </a:r>
+          </a:p>
+          <a:p>
+            <a:endParaRPr lang="en-IN" sz="1800" b="1" dirty="0">
+              <a:solidFill>
+                <a:srgbClr val="292929"/>
+              </a:solidFill>
+              <a:latin typeface="medium-content-serif-font"/>
+            </a:endParaRPr>
+          </a:p>
+          <a:p>
+            <a:endParaRPr lang="en-IN" sz="1800" b="1" dirty="0">
+              <a:solidFill>
+                <a:srgbClr val="292929"/>
+              </a:solidFill>
+              <a:latin typeface="medium-content-serif-font"/>
+            </a:endParaRPr>
+          </a:p>
+        </p:txBody>
+      </p:sp>
+      <p:sp>
+        <p:nvSpPr>
+          <p:cNvPr id="5" name="TextBox 4">
+            <a:extLst>
+              <a:ext uri="{FF2B5EF4-FFF2-40B4-BE49-F238E27FC236}">
+                <a16:creationId xmlns:a16="http://schemas.microsoft.com/office/drawing/2014/main" id="{173BCDFB-D695-4CC4-AA6D-B402A6DF631A}"/>
+              </a:ext>
+            </a:extLst>
+          </p:cNvPr>
+          <p:cNvSpPr txBox="1"/>
+          <p:nvPr/>
+        </p:nvSpPr>
+        <p:spPr>
+          <a:xfrm>
+            <a:off x="1782618" y="6371555"/>
+            <a:ext cx="8857672" cy="369332"/>
+          </a:xfrm>
+          <a:prstGeom prst="rect">
+            <a:avLst/>
+          </a:prstGeom>
+          <a:noFill/>
+        </p:spPr>
+        <p:txBody>
+          <a:bodyPr wrap="square">
+            <a:spAutoFit/>
+          </a:bodyPr>
+          <a:lstStyle/>
+          <a:p>
+            <a:pPr algn="ctr"/>
             <a:r>
               <a:rPr lang="en-IN" dirty="0"/>
-              <a:t>The problem with decision trees is that they are unstable.</a:t>
-            </a:r>
-          </a:p>
-          <a:p>
-            <a:r>
-              <a:rPr lang="en-US" dirty="0"/>
-              <a:t>Overfitting occurs when we have a very flexible model (the model has a high capacity) which essentially memorizes the training data by fitting it closely. </a:t>
-            </a:r>
-          </a:p>
-          <a:p>
-            <a:r>
-              <a:rPr lang="en-US" dirty="0"/>
-              <a:t>The problem is that the model learns not only the actual relationships in the training data, but also any noise that is present. </a:t>
-            </a:r>
-          </a:p>
-          <a:p>
-            <a:r>
-              <a:rPr lang="en-US" dirty="0"/>
-              <a:t>A flexible model is said to have high variance because the learned parameters (such as the structure of the decision tree) will vary considerably with the training data.</a:t>
-            </a:r>
-          </a:p>
-          <a:p>
-            <a:r>
-              <a:rPr lang="en-US" dirty="0"/>
-              <a:t>Inflexible model has high bias.</a:t>
-            </a:r>
-          </a:p>
-          <a:p>
-            <a:endParaRPr lang="en-US" dirty="0"/>
-          </a:p>
-          <a:p>
-            <a:endParaRPr lang="en-US" dirty="0"/>
-          </a:p>
-          <a:p>
-            <a:endParaRPr lang="en-IN" dirty="0"/>
+              <a:t>Source: Analytics Vidhya</a:t>
+            </a:r>
           </a:p>
         </p:txBody>
       </p:sp>
     </p:spTree>
     <p:extLst>
       <p:ext uri="{BB962C8B-B14F-4D97-AF65-F5344CB8AC3E}">
-        <p14:creationId xmlns:p14="http://schemas.microsoft.com/office/powerpoint/2010/main" val="3777047584"/>
+        <p14:creationId xmlns:p14="http://schemas.microsoft.com/office/powerpoint/2010/main" val="2321707161"/>
       </p:ext>
     </p:extLst>
   </p:cSld>
@@ -7101,6 +7170,135 @@
           <p:cNvPr id="2" name="Title 1">
             <a:extLst>
               <a:ext uri="{FF2B5EF4-FFF2-40B4-BE49-F238E27FC236}">
+                <a16:creationId xmlns:a16="http://schemas.microsoft.com/office/drawing/2014/main" id="{2E722728-C213-45CF-81EE-B0A0DC4C3076}"/>
+              </a:ext>
+            </a:extLst>
+          </p:cNvPr>
+          <p:cNvSpPr>
+            <a:spLocks noGrp="1"/>
+          </p:cNvSpPr>
+          <p:nvPr>
+            <p:ph type="title"/>
+          </p:nvPr>
+        </p:nvSpPr>
+        <p:spPr>
+          <a:xfrm>
+            <a:off x="978429" y="193645"/>
+            <a:ext cx="10364451" cy="609920"/>
+          </a:xfrm>
+        </p:spPr>
+        <p:txBody>
+          <a:bodyPr/>
+          <a:lstStyle/>
+          <a:p>
+            <a:r>
+              <a:rPr lang="en-IN" dirty="0"/>
+              <a:t>Problems with decision trees</a:t>
+            </a:r>
+          </a:p>
+        </p:txBody>
+      </p:sp>
+      <p:sp>
+        <p:nvSpPr>
+          <p:cNvPr id="3" name="Content Placeholder 2">
+            <a:extLst>
+              <a:ext uri="{FF2B5EF4-FFF2-40B4-BE49-F238E27FC236}">
+                <a16:creationId xmlns:a16="http://schemas.microsoft.com/office/drawing/2014/main" id="{355E0A12-0DCA-4CD0-9134-284C60A0F35D}"/>
+              </a:ext>
+            </a:extLst>
+          </p:cNvPr>
+          <p:cNvSpPr>
+            <a:spLocks noGrp="1"/>
+          </p:cNvSpPr>
+          <p:nvPr>
+            <p:ph sz="quarter" idx="13"/>
+          </p:nvPr>
+        </p:nvSpPr>
+        <p:spPr>
+          <a:xfrm>
+            <a:off x="1052320" y="944692"/>
+            <a:ext cx="10363826" cy="4061417"/>
+          </a:xfrm>
+        </p:spPr>
+        <p:txBody>
+          <a:bodyPr/>
+          <a:lstStyle/>
+          <a:p>
+            <a:r>
+              <a:rPr lang="en-IN" dirty="0"/>
+              <a:t>The problem with decision trees is that they are unstable.</a:t>
+            </a:r>
+          </a:p>
+          <a:p>
+            <a:r>
+              <a:rPr lang="en-US" dirty="0"/>
+              <a:t>Overfitting occurs when we have a very flexible model (the model has a high capacity) which essentially memorizes the training data by fitting it closely. </a:t>
+            </a:r>
+          </a:p>
+          <a:p>
+            <a:r>
+              <a:rPr lang="en-US" dirty="0"/>
+              <a:t>The problem is that the model learns not only the actual relationships in the training data, but also any noise that is present. </a:t>
+            </a:r>
+          </a:p>
+          <a:p>
+            <a:r>
+              <a:rPr lang="en-US" dirty="0"/>
+              <a:t>A flexible model is said to have high variance because the learned parameters (such as the structure of the decision tree) will vary considerably with the training data.</a:t>
+            </a:r>
+          </a:p>
+          <a:p>
+            <a:r>
+              <a:rPr lang="en-US" dirty="0"/>
+              <a:t>Inflexible model has high bias.</a:t>
+            </a:r>
+          </a:p>
+          <a:p>
+            <a:endParaRPr lang="en-US" dirty="0"/>
+          </a:p>
+          <a:p>
+            <a:endParaRPr lang="en-US" dirty="0"/>
+          </a:p>
+          <a:p>
+            <a:endParaRPr lang="en-IN" dirty="0"/>
+          </a:p>
+        </p:txBody>
+      </p:sp>
+    </p:spTree>
+    <p:extLst>
+      <p:ext uri="{BB962C8B-B14F-4D97-AF65-F5344CB8AC3E}">
+        <p14:creationId xmlns:p14="http://schemas.microsoft.com/office/powerpoint/2010/main" val="3777047584"/>
+      </p:ext>
+    </p:extLst>
+  </p:cSld>
+  <p:clrMapOvr>
+    <a:masterClrMapping/>
+  </p:clrMapOvr>
+</p:sld>
+</file>
+
+<file path=ppt/slides/slide15.xml><?xml version="1.0" encoding="utf-8"?>
+<p:sld xmlns:a="http://schemas.openxmlformats.org/drawingml/2006/main" xmlns:r="http://schemas.openxmlformats.org/officeDocument/2006/relationships" xmlns:p="http://schemas.openxmlformats.org/presentationml/2006/main">
+  <p:cSld>
+    <p:spTree>
+      <p:nvGrpSpPr>
+        <p:cNvPr id="1" name=""/>
+        <p:cNvGrpSpPr/>
+        <p:nvPr/>
+      </p:nvGrpSpPr>
+      <p:grpSpPr>
+        <a:xfrm>
+          <a:off x="0" y="0"/>
+          <a:ext cx="0" cy="0"/>
+          <a:chOff x="0" y="0"/>
+          <a:chExt cx="0" cy="0"/>
+        </a:xfrm>
+      </p:grpSpPr>
+      <p:sp>
+        <p:nvSpPr>
+          <p:cNvPr id="2" name="Title 1">
+            <a:extLst>
+              <a:ext uri="{FF2B5EF4-FFF2-40B4-BE49-F238E27FC236}">
                 <a16:creationId xmlns:a16="http://schemas.microsoft.com/office/drawing/2014/main" id="{FD386B4C-E106-4923-A68F-B534AECE16D5}"/>
               </a:ext>
             </a:extLst>
@@ -7300,7 +7498,7 @@
 </p:sld>
 </file>
 
-<file path=ppt/slides/slide15.xml><?xml version="1.0" encoding="utf-8"?>
+<file path=ppt/slides/slide16.xml><?xml version="1.0" encoding="utf-8"?>
 <p:sld xmlns:a="http://schemas.openxmlformats.org/drawingml/2006/main" xmlns:r="http://schemas.openxmlformats.org/officeDocument/2006/relationships" xmlns:p="http://schemas.openxmlformats.org/presentationml/2006/main">
   <p:cSld>
     <p:spTree>
@@ -7577,7 +7775,7 @@
 </p:sld>
 </file>
 
-<file path=ppt/slides/slide16.xml><?xml version="1.0" encoding="utf-8"?>
+<file path=ppt/slides/slide17.xml><?xml version="1.0" encoding="utf-8"?>
 <p:sld xmlns:a="http://schemas.openxmlformats.org/drawingml/2006/main" xmlns:r="http://schemas.openxmlformats.org/officeDocument/2006/relationships" xmlns:p="http://schemas.openxmlformats.org/presentationml/2006/main">
   <p:cSld>
     <p:spTree>
@@ -7661,147 +7859,6 @@
     <p:extLst>
       <p:ext uri="{BB962C8B-B14F-4D97-AF65-F5344CB8AC3E}">
         <p14:creationId xmlns:p14="http://schemas.microsoft.com/office/powerpoint/2010/main" val="3695749678"/>
-      </p:ext>
-    </p:extLst>
-  </p:cSld>
-  <p:clrMapOvr>
-    <a:masterClrMapping/>
-  </p:clrMapOvr>
-</p:sld>
-</file>
-
-<file path=ppt/slides/slide17.xml><?xml version="1.0" encoding="utf-8"?>
-<p:sld xmlns:a="http://schemas.openxmlformats.org/drawingml/2006/main" xmlns:r="http://schemas.openxmlformats.org/officeDocument/2006/relationships" xmlns:p="http://schemas.openxmlformats.org/presentationml/2006/main">
-  <p:cSld>
-    <p:spTree>
-      <p:nvGrpSpPr>
-        <p:cNvPr id="1" name=""/>
-        <p:cNvGrpSpPr/>
-        <p:nvPr/>
-      </p:nvGrpSpPr>
-      <p:grpSpPr>
-        <a:xfrm>
-          <a:off x="0" y="0"/>
-          <a:ext cx="0" cy="0"/>
-          <a:chOff x="0" y="0"/>
-          <a:chExt cx="0" cy="0"/>
-        </a:xfrm>
-      </p:grpSpPr>
-      <p:sp>
-        <p:nvSpPr>
-          <p:cNvPr id="2" name="Title 1">
-            <a:extLst>
-              <a:ext uri="{FF2B5EF4-FFF2-40B4-BE49-F238E27FC236}">
-                <a16:creationId xmlns:a16="http://schemas.microsoft.com/office/drawing/2014/main" id="{782D77A8-1EC1-440E-B386-CC73D220B8B3}"/>
-              </a:ext>
-            </a:extLst>
-          </p:cNvPr>
-          <p:cNvSpPr>
-            <a:spLocks noGrp="1"/>
-          </p:cNvSpPr>
-          <p:nvPr>
-            <p:ph type="title"/>
-          </p:nvPr>
-        </p:nvSpPr>
-        <p:spPr>
-          <a:xfrm>
-            <a:off x="913775" y="618517"/>
-            <a:ext cx="10364451" cy="646865"/>
-          </a:xfrm>
-        </p:spPr>
-        <p:txBody>
-          <a:bodyPr/>
-          <a:lstStyle/>
-          <a:p>
-            <a:r>
-              <a:rPr lang="en-IN" dirty="0"/>
-              <a:t>Boosting</a:t>
-            </a:r>
-          </a:p>
-        </p:txBody>
-      </p:sp>
-      <p:sp>
-        <p:nvSpPr>
-          <p:cNvPr id="3" name="Content Placeholder 2">
-            <a:extLst>
-              <a:ext uri="{FF2B5EF4-FFF2-40B4-BE49-F238E27FC236}">
-                <a16:creationId xmlns:a16="http://schemas.microsoft.com/office/drawing/2014/main" id="{A4E54165-9F8E-4D28-B4FB-7B74CBD83391}"/>
-              </a:ext>
-            </a:extLst>
-          </p:cNvPr>
-          <p:cNvSpPr>
-            <a:spLocks noGrp="1"/>
-          </p:cNvSpPr>
-          <p:nvPr>
-            <p:ph sz="quarter" idx="13"/>
-          </p:nvPr>
-        </p:nvSpPr>
-        <p:spPr>
-          <a:xfrm>
-            <a:off x="914087" y="1388037"/>
-            <a:ext cx="10363826" cy="2223381"/>
-          </a:xfrm>
-        </p:spPr>
-        <p:txBody>
-          <a:bodyPr/>
-          <a:lstStyle/>
-          <a:p>
-            <a:r>
-              <a:rPr lang="en-US" dirty="0"/>
-              <a:t>The term ‘Boosting’ refers to a family of algorithms which converts weak learner to strong learners. </a:t>
-            </a:r>
-          </a:p>
-          <a:p>
-            <a:r>
-              <a:rPr lang="en-US" dirty="0"/>
-              <a:t>Boosting is an ensemble method for improving the model predictions of any given learning algorithm.</a:t>
-            </a:r>
-          </a:p>
-          <a:p>
-            <a:r>
-              <a:rPr lang="en-US" dirty="0"/>
-              <a:t>Boosting improves predictions sequentially. Bagging is parallel.</a:t>
-            </a:r>
-          </a:p>
-          <a:p>
-            <a:endParaRPr lang="en-US" dirty="0"/>
-          </a:p>
-        </p:txBody>
-      </p:sp>
-      <p:pic>
-        <p:nvPicPr>
-          <p:cNvPr id="4" name="Picture 3">
-            <a:extLst>
-              <a:ext uri="{FF2B5EF4-FFF2-40B4-BE49-F238E27FC236}">
-                <a16:creationId xmlns:a16="http://schemas.microsoft.com/office/drawing/2014/main" id="{AF039A8F-36B7-4DB3-B182-65C83E4ED507}"/>
-              </a:ext>
-            </a:extLst>
-          </p:cNvPr>
-          <p:cNvPicPr>
-            <a:picLocks noChangeAspect="1"/>
-          </p:cNvPicPr>
-          <p:nvPr/>
-        </p:nvPicPr>
-        <p:blipFill>
-          <a:blip r:embed="rId2"/>
-          <a:stretch>
-            <a:fillRect/>
-          </a:stretch>
-        </p:blipFill>
-        <p:spPr>
-          <a:xfrm>
-            <a:off x="1321232" y="3788800"/>
-            <a:ext cx="8201025" cy="3362325"/>
-          </a:xfrm>
-          <a:prstGeom prst="rect">
-            <a:avLst/>
-          </a:prstGeom>
-        </p:spPr>
-      </p:pic>
-    </p:spTree>
-    <p:extLst>
-      <p:ext uri="{BB962C8B-B14F-4D97-AF65-F5344CB8AC3E}">
-        <p14:creationId xmlns:p14="http://schemas.microsoft.com/office/powerpoint/2010/main" val="385589492"/>
       </p:ext>
     </p:extLst>
   </p:cSld>
@@ -7833,7 +7890,7 @@
           <p:cNvPr id="2" name="Title 1">
             <a:extLst>
               <a:ext uri="{FF2B5EF4-FFF2-40B4-BE49-F238E27FC236}">
-                <a16:creationId xmlns:a16="http://schemas.microsoft.com/office/drawing/2014/main" id="{655A93E0-30BA-4938-AC93-ECC71596C646}"/>
+                <a16:creationId xmlns:a16="http://schemas.microsoft.com/office/drawing/2014/main" id="{782D77A8-1EC1-440E-B386-CC73D220B8B3}"/>
               </a:ext>
             </a:extLst>
           </p:cNvPr>
@@ -7846,21 +7903,18 @@
         </p:nvSpPr>
         <p:spPr>
           <a:xfrm>
-            <a:off x="913774" y="184409"/>
-            <a:ext cx="10364451" cy="448284"/>
-          </a:xfrm>
-        </p:spPr>
-        <p:txBody>
-          <a:bodyPr>
-            <a:normAutofit fontScale="90000"/>
-          </a:bodyPr>
-          <a:lstStyle/>
-          <a:p>
-            <a:r>
-              <a:rPr lang="en-IN" dirty="0" err="1"/>
-              <a:t>ADABoost</a:t>
-            </a:r>
-            <a:endParaRPr lang="en-IN" dirty="0"/>
+            <a:off x="913775" y="618517"/>
+            <a:ext cx="10364451" cy="646865"/>
+          </a:xfrm>
+        </p:spPr>
+        <p:txBody>
+          <a:bodyPr/>
+          <a:lstStyle/>
+          <a:p>
+            <a:r>
+              <a:rPr lang="en-IN" dirty="0"/>
+              <a:t>Boosting</a:t>
+            </a:r>
           </a:p>
         </p:txBody>
       </p:sp>
@@ -7869,7 +7923,7 @@
           <p:cNvPr id="3" name="Content Placeholder 2">
             <a:extLst>
               <a:ext uri="{FF2B5EF4-FFF2-40B4-BE49-F238E27FC236}">
-                <a16:creationId xmlns:a16="http://schemas.microsoft.com/office/drawing/2014/main" id="{1917E0A2-F82F-414B-AB00-2F600E66DF04}"/>
+                <a16:creationId xmlns:a16="http://schemas.microsoft.com/office/drawing/2014/main" id="{A4E54165-9F8E-4D28-B4FB-7B74CBD83391}"/>
               </a:ext>
             </a:extLst>
           </p:cNvPr>
@@ -7882,49 +7936,33 @@
         </p:nvSpPr>
         <p:spPr>
           <a:xfrm>
-            <a:off x="1006138" y="1066802"/>
-            <a:ext cx="6068917" cy="5407889"/>
-          </a:xfrm>
-        </p:spPr>
-        <p:txBody>
-          <a:bodyPr>
-            <a:normAutofit/>
-          </a:bodyPr>
-          <a:lstStyle/>
-          <a:p>
-            <a:r>
-              <a:rPr lang="en-IN" dirty="0"/>
-              <a:t>Stands for adaptive boosting.</a:t>
-            </a:r>
-          </a:p>
+            <a:off x="914087" y="1388037"/>
+            <a:ext cx="10363826" cy="2223381"/>
+          </a:xfrm>
+        </p:spPr>
+        <p:txBody>
+          <a:bodyPr/>
+          <a:lstStyle/>
           <a:p>
             <a:r>
               <a:rPr lang="en-US" dirty="0"/>
-              <a:t>The weak learners in AdaBoost are decision trees with a single split, called </a:t>
-            </a:r>
-            <a:r>
-              <a:rPr lang="en-US" b="1" dirty="0"/>
-              <a:t>decision stumps.</a:t>
+              <a:t>The term ‘Boosting’ refers to a family of algorithms which converts weak learner to strong learners. </a:t>
             </a:r>
           </a:p>
           <a:p>
             <a:r>
               <a:rPr lang="en-US" dirty="0"/>
-              <a:t>AdaBoost creates its first decision stump, all observations are weighted equally.</a:t>
+              <a:t>Boosting is an ensemble method for improving the model predictions of any given learning algorithm.</a:t>
             </a:r>
           </a:p>
           <a:p>
             <a:r>
               <a:rPr lang="en-US" dirty="0"/>
-              <a:t>To correct the previous error, the observations that were incorrectly classified now carry more weight than the observations that were correctly classified.</a:t>
-            </a:r>
-          </a:p>
-          <a:p>
-            <a:r>
-              <a:rPr lang="en-US" dirty="0"/>
-              <a:t>AdaBoost algorithms can be used for both classification and regression problem.</a:t>
-            </a:r>
-            <a:endParaRPr lang="en-IN" dirty="0"/>
+              <a:t>Boosting improves predictions sequentially. Bagging is parallel.</a:t>
+            </a:r>
+          </a:p>
+          <a:p>
+            <a:endParaRPr lang="en-US" dirty="0"/>
           </a:p>
         </p:txBody>
       </p:sp>
@@ -7933,7 +7971,7 @@
           <p:cNvPr id="4" name="Picture 3">
             <a:extLst>
               <a:ext uri="{FF2B5EF4-FFF2-40B4-BE49-F238E27FC236}">
-                <a16:creationId xmlns:a16="http://schemas.microsoft.com/office/drawing/2014/main" id="{2B70984E-1DBC-4D50-907B-62ADC4197B90}"/>
+                <a16:creationId xmlns:a16="http://schemas.microsoft.com/office/drawing/2014/main" id="{AF039A8F-36B7-4DB3-B182-65C83E4ED507}"/>
               </a:ext>
             </a:extLst>
           </p:cNvPr>
@@ -7950,54 +7988,18 @@
         </p:blipFill>
         <p:spPr>
           <a:xfrm>
-            <a:off x="7222836" y="853785"/>
-            <a:ext cx="4642860" cy="5620905"/>
+            <a:off x="1321232" y="3788800"/>
+            <a:ext cx="8201025" cy="3362325"/>
           </a:xfrm>
           <a:prstGeom prst="rect">
             <a:avLst/>
           </a:prstGeom>
         </p:spPr>
       </p:pic>
-      <p:sp>
-        <p:nvSpPr>
-          <p:cNvPr id="6" name="TextBox 5">
-            <a:extLst>
-              <a:ext uri="{FF2B5EF4-FFF2-40B4-BE49-F238E27FC236}">
-                <a16:creationId xmlns:a16="http://schemas.microsoft.com/office/drawing/2014/main" id="{D5C94A61-8BCA-4452-97DC-456202288AFF}"/>
-              </a:ext>
-            </a:extLst>
-          </p:cNvPr>
-          <p:cNvSpPr txBox="1"/>
-          <p:nvPr/>
-        </p:nvSpPr>
-        <p:spPr>
-          <a:xfrm>
-            <a:off x="701964" y="6568824"/>
-            <a:ext cx="9929090" cy="253916"/>
-          </a:xfrm>
-          <a:prstGeom prst="rect">
-            <a:avLst/>
-          </a:prstGeom>
-          <a:noFill/>
-        </p:spPr>
-        <p:txBody>
-          <a:bodyPr wrap="square">
-            <a:spAutoFit/>
-          </a:bodyPr>
-          <a:lstStyle/>
-          <a:p>
-            <a:pPr algn="ctr"/>
-            <a:r>
-              <a:rPr lang="en-IN" sz="1050" dirty="0"/>
-              <a:t>Source: https://medium.com/greyatom/a-quick-guide-to-boosting-in-ml-acf7c1585cb5#:~:text=What%20is%20Boosting%3F,trying%20to%20correct%20its%20predecessor.</a:t>
-            </a:r>
-          </a:p>
-        </p:txBody>
-      </p:sp>
     </p:spTree>
     <p:extLst>
       <p:ext uri="{BB962C8B-B14F-4D97-AF65-F5344CB8AC3E}">
-        <p14:creationId xmlns:p14="http://schemas.microsoft.com/office/powerpoint/2010/main" val="2613382699"/>
+        <p14:creationId xmlns:p14="http://schemas.microsoft.com/office/powerpoint/2010/main" val="385589492"/>
       </p:ext>
     </p:extLst>
   </p:cSld>
@@ -8053,9 +8055,10 @@
           <a:lstStyle/>
           <a:p>
             <a:r>
-              <a:rPr lang="en-IN" dirty="0"/>
-              <a:t>Gradient boosting</a:t>
-            </a:r>
+              <a:rPr lang="en-IN" dirty="0" err="1"/>
+              <a:t>ADABoost</a:t>
+            </a:r>
+            <a:endParaRPr lang="en-IN" dirty="0"/>
           </a:p>
         </p:txBody>
       </p:sp>
@@ -8077,126 +8080,58 @@
         </p:nvSpPr>
         <p:spPr>
           <a:xfrm>
-            <a:off x="1006139" y="1066802"/>
-            <a:ext cx="4526444" cy="5407889"/>
+            <a:off x="1006138" y="1066802"/>
+            <a:ext cx="6068917" cy="5407889"/>
           </a:xfrm>
         </p:spPr>
         <p:txBody>
           <a:bodyPr>
-            <a:normAutofit fontScale="85000" lnSpcReduction="20000"/>
+            <a:normAutofit/>
           </a:bodyPr>
           <a:lstStyle/>
           <a:p>
             <a:r>
+              <a:rPr lang="en-IN" dirty="0"/>
+              <a:t>Stands for adaptive boosting.</a:t>
+            </a:r>
+          </a:p>
+          <a:p>
+            <a:r>
               <a:rPr lang="en-US" dirty="0"/>
-              <a:t>Gradient Boosting works by sequentially adding predictors to an ensemble, each one correcting its predecessor.</a:t>
+              <a:t>The weak learners in AdaBoost are decision trees with a single split, called </a:t>
+            </a:r>
+            <a:r>
+              <a:rPr lang="en-US" b="1" dirty="0"/>
+              <a:t>decision stumps.</a:t>
             </a:r>
           </a:p>
           <a:p>
             <a:r>
               <a:rPr lang="en-US" dirty="0"/>
-              <a:t>instead of changing the weights for every incorrect classified observation at every iteration like AdaBoost, Gradient Boosting method tries to fit the new predictor to the residual errors made by the previous predictor.</a:t>
-            </a:r>
-          </a:p>
-          <a:p>
-            <a:r>
-              <a:rPr lang="en-US" dirty="0">
-                <a:solidFill>
-                  <a:schemeClr val="accent6">
-                    <a:lumMod val="50000"/>
-                  </a:schemeClr>
-                </a:solidFill>
-              </a:rPr>
-              <a:t>GBM uses Gradient Descent to find the shortcomings in the previous learner’s predictions. GBM algorithm can be given by following steps.</a:t>
-            </a:r>
-          </a:p>
-          <a:p>
-            <a:r>
-              <a:rPr lang="en-US" dirty="0">
-                <a:solidFill>
-                  <a:schemeClr val="accent6">
-                    <a:lumMod val="50000"/>
-                  </a:schemeClr>
-                </a:solidFill>
-              </a:rPr>
-              <a:t>Fit a model to the data, F1(x) = y</a:t>
-            </a:r>
-          </a:p>
-          <a:p>
-            <a:r>
-              <a:rPr lang="en-US" dirty="0">
-                <a:solidFill>
-                  <a:schemeClr val="accent6">
-                    <a:lumMod val="50000"/>
-                  </a:schemeClr>
-                </a:solidFill>
-              </a:rPr>
-              <a:t>Fit a model to the residuals, h1(x) = y−F1(x)</a:t>
-            </a:r>
-          </a:p>
-          <a:p>
-            <a:r>
-              <a:rPr lang="en-US" dirty="0">
-                <a:solidFill>
-                  <a:schemeClr val="accent6">
-                    <a:lumMod val="50000"/>
-                  </a:schemeClr>
-                </a:solidFill>
-              </a:rPr>
-              <a:t>Create a new model, F2(x) = F1(x) + h1(x)</a:t>
-            </a:r>
-            <a:endParaRPr lang="en-IN" dirty="0">
-              <a:solidFill>
-                <a:schemeClr val="accent6">
-                  <a:lumMod val="50000"/>
-                </a:schemeClr>
-              </a:solidFill>
-            </a:endParaRPr>
-          </a:p>
-        </p:txBody>
-      </p:sp>
-      <p:sp>
-        <p:nvSpPr>
-          <p:cNvPr id="6" name="TextBox 5">
+              <a:t>AdaBoost creates its first decision stump, all observations are weighted equally.</a:t>
+            </a:r>
+          </a:p>
+          <a:p>
+            <a:r>
+              <a:rPr lang="en-US" dirty="0"/>
+              <a:t>To correct the previous error, the observations that were incorrectly classified now carry more weight than the observations that were correctly classified.</a:t>
+            </a:r>
+          </a:p>
+          <a:p>
+            <a:r>
+              <a:rPr lang="en-US" dirty="0"/>
+              <a:t>AdaBoost algorithms can be used for both classification and regression problem.</a:t>
+            </a:r>
+            <a:endParaRPr lang="en-IN" dirty="0"/>
+          </a:p>
+        </p:txBody>
+      </p:sp>
+      <p:pic>
+        <p:nvPicPr>
+          <p:cNvPr id="4" name="Picture 3">
             <a:extLst>
               <a:ext uri="{FF2B5EF4-FFF2-40B4-BE49-F238E27FC236}">
-                <a16:creationId xmlns:a16="http://schemas.microsoft.com/office/drawing/2014/main" id="{D5C94A61-8BCA-4452-97DC-456202288AFF}"/>
-              </a:ext>
-            </a:extLst>
-          </p:cNvPr>
-          <p:cNvSpPr txBox="1"/>
-          <p:nvPr/>
-        </p:nvSpPr>
-        <p:spPr>
-          <a:xfrm>
-            <a:off x="701964" y="6568824"/>
-            <a:ext cx="9929090" cy="253916"/>
-          </a:xfrm>
-          <a:prstGeom prst="rect">
-            <a:avLst/>
-          </a:prstGeom>
-          <a:noFill/>
-        </p:spPr>
-        <p:txBody>
-          <a:bodyPr wrap="square">
-            <a:spAutoFit/>
-          </a:bodyPr>
-          <a:lstStyle/>
-          <a:p>
-            <a:pPr algn="ctr"/>
-            <a:r>
-              <a:rPr lang="en-IN" sz="1050" dirty="0"/>
-              <a:t>Source: https://medium.com/greyatom/a-quick-guide-to-boosting-in-ml-acf7c1585cb5#:~:text=What%20is%20Boosting%3F,trying%20to%20correct%20its%20predecessor.</a:t>
-            </a:r>
-          </a:p>
-        </p:txBody>
-      </p:sp>
-      <p:pic>
-        <p:nvPicPr>
-          <p:cNvPr id="5" name="Picture 4">
-            <a:extLst>
-              <a:ext uri="{FF2B5EF4-FFF2-40B4-BE49-F238E27FC236}">
-                <a16:creationId xmlns:a16="http://schemas.microsoft.com/office/drawing/2014/main" id="{00D54761-6936-408D-B5F1-A61DD51C40DE}"/>
+                <a16:creationId xmlns:a16="http://schemas.microsoft.com/office/drawing/2014/main" id="{2B70984E-1DBC-4D50-907B-62ADC4197B90}"/>
               </a:ext>
             </a:extLst>
           </p:cNvPr>
@@ -8213,18 +8148,54 @@
         </p:blipFill>
         <p:spPr>
           <a:xfrm>
-            <a:off x="5689600" y="1066802"/>
-            <a:ext cx="6373091" cy="3543300"/>
+            <a:off x="7222836" y="853785"/>
+            <a:ext cx="4642860" cy="5620905"/>
           </a:xfrm>
           <a:prstGeom prst="rect">
             <a:avLst/>
           </a:prstGeom>
         </p:spPr>
       </p:pic>
+      <p:sp>
+        <p:nvSpPr>
+          <p:cNvPr id="6" name="TextBox 5">
+            <a:extLst>
+              <a:ext uri="{FF2B5EF4-FFF2-40B4-BE49-F238E27FC236}">
+                <a16:creationId xmlns:a16="http://schemas.microsoft.com/office/drawing/2014/main" id="{D5C94A61-8BCA-4452-97DC-456202288AFF}"/>
+              </a:ext>
+            </a:extLst>
+          </p:cNvPr>
+          <p:cNvSpPr txBox="1"/>
+          <p:nvPr/>
+        </p:nvSpPr>
+        <p:spPr>
+          <a:xfrm>
+            <a:off x="701964" y="6568824"/>
+            <a:ext cx="9929090" cy="253916"/>
+          </a:xfrm>
+          <a:prstGeom prst="rect">
+            <a:avLst/>
+          </a:prstGeom>
+          <a:noFill/>
+        </p:spPr>
+        <p:txBody>
+          <a:bodyPr wrap="square">
+            <a:spAutoFit/>
+          </a:bodyPr>
+          <a:lstStyle/>
+          <a:p>
+            <a:pPr algn="ctr"/>
+            <a:r>
+              <a:rPr lang="en-IN" sz="1050" dirty="0"/>
+              <a:t>Source: https://medium.com/greyatom/a-quick-guide-to-boosting-in-ml-acf7c1585cb5#:~:text=What%20is%20Boosting%3F,trying%20to%20correct%20its%20predecessor.</a:t>
+            </a:r>
+          </a:p>
+        </p:txBody>
+      </p:sp>
     </p:spTree>
     <p:extLst>
       <p:ext uri="{BB962C8B-B14F-4D97-AF65-F5344CB8AC3E}">
-        <p14:creationId xmlns:p14="http://schemas.microsoft.com/office/powerpoint/2010/main" val="3333535548"/>
+        <p14:creationId xmlns:p14="http://schemas.microsoft.com/office/powerpoint/2010/main" val="2613382699"/>
       </p:ext>
     </p:extLst>
   </p:cSld>
@@ -8256,7 +8227,7 @@
           <p:cNvPr id="2" name="Title 1">
             <a:extLst>
               <a:ext uri="{FF2B5EF4-FFF2-40B4-BE49-F238E27FC236}">
-                <a16:creationId xmlns:a16="http://schemas.microsoft.com/office/drawing/2014/main" id="{1C4809CD-D024-4DEA-9966-DFBB0BA07CCA}"/>
+                <a16:creationId xmlns:a16="http://schemas.microsoft.com/office/drawing/2014/main" id="{ADA5E16F-0055-40A5-98E1-5002A420FD90}"/>
               </a:ext>
             </a:extLst>
           </p:cNvPr>
@@ -8267,21 +8238,14 @@
             <p:ph type="title"/>
           </p:nvPr>
         </p:nvSpPr>
-        <p:spPr>
-          <a:xfrm>
-            <a:off x="913775" y="618518"/>
-            <a:ext cx="10364451" cy="582210"/>
-          </a:xfrm>
-        </p:spPr>
-        <p:txBody>
-          <a:bodyPr>
-            <a:normAutofit fontScale="90000"/>
-          </a:bodyPr>
-          <a:lstStyle/>
-          <a:p>
-            <a:r>
-              <a:rPr lang="en-IN" dirty="0"/>
-              <a:t>What is a decision Tree</a:t>
+        <p:spPr/>
+        <p:txBody>
+          <a:bodyPr/>
+          <a:lstStyle/>
+          <a:p>
+            <a:r>
+              <a:rPr lang="en-IN" sz="3200" dirty="0"/>
+              <a:t>Go To the link and keep selecting an option till you reach the edge(Leaf) of the tree</a:t>
             </a:r>
           </a:p>
         </p:txBody>
@@ -8291,7 +8255,7 @@
           <p:cNvPr id="3" name="Content Placeholder 2">
             <a:extLst>
               <a:ext uri="{FF2B5EF4-FFF2-40B4-BE49-F238E27FC236}">
-                <a16:creationId xmlns:a16="http://schemas.microsoft.com/office/drawing/2014/main" id="{945078C4-2CBE-4031-9EA8-EB074881424B}"/>
+                <a16:creationId xmlns:a16="http://schemas.microsoft.com/office/drawing/2014/main" id="{1911B32D-31AF-49C7-85EA-11F17F12C1CC}"/>
               </a:ext>
             </a:extLst>
           </p:cNvPr>
@@ -8302,105 +8266,34 @@
             <p:ph sz="quarter" idx="13"/>
           </p:nvPr>
         </p:nvSpPr>
-        <p:spPr>
-          <a:xfrm>
-            <a:off x="913774" y="1200728"/>
-            <a:ext cx="4997499" cy="5504872"/>
-          </a:xfrm>
-        </p:spPr>
+        <p:spPr/>
         <p:txBody>
           <a:bodyPr/>
           <a:lstStyle/>
           <a:p>
             <a:r>
-              <a:rPr lang="en-US" dirty="0"/>
-              <a:t>A decision tree is often a generalization of the experts' experience, a means of sharing knowledge of a particular process. </a:t>
-            </a:r>
-          </a:p>
-          <a:p>
-            <a:r>
-              <a:rPr lang="en-US" dirty="0"/>
-              <a:t>For example, before the introduction of scalable machine learning algorithms, the credit scoring task in the banking sector was solved by experts. </a:t>
-            </a:r>
-          </a:p>
-          <a:p>
-            <a:r>
-              <a:rPr lang="en-US" dirty="0"/>
-              <a:t>The decision to grant a loan was made on the basis of some intuitively (or empirically) derived rules that could be represented as a decision tree.</a:t>
-            </a:r>
-            <a:endParaRPr lang="en-IN" dirty="0"/>
-          </a:p>
-        </p:txBody>
-      </p:sp>
-      <p:pic>
-        <p:nvPicPr>
-          <p:cNvPr id="4" name="Picture 3">
-            <a:extLst>
-              <a:ext uri="{FF2B5EF4-FFF2-40B4-BE49-F238E27FC236}">
-                <a16:creationId xmlns:a16="http://schemas.microsoft.com/office/drawing/2014/main" id="{47762C11-41D3-4E90-8A0C-750AE1C10C87}"/>
-              </a:ext>
-            </a:extLst>
-          </p:cNvPr>
-          <p:cNvPicPr>
-            <a:picLocks noChangeAspect="1"/>
-          </p:cNvPicPr>
-          <p:nvPr/>
-        </p:nvPicPr>
-        <p:blipFill>
-          <a:blip r:embed="rId2"/>
-          <a:stretch>
-            <a:fillRect/>
-          </a:stretch>
-        </p:blipFill>
-        <p:spPr>
-          <a:xfrm>
-            <a:off x="6280729" y="1200728"/>
-            <a:ext cx="5514109" cy="4343400"/>
-          </a:xfrm>
-          <a:prstGeom prst="rect">
-            <a:avLst/>
-          </a:prstGeom>
-        </p:spPr>
-      </p:pic>
-      <p:sp>
-        <p:nvSpPr>
-          <p:cNvPr id="5" name="TextBox 4">
-            <a:extLst>
-              <a:ext uri="{FF2B5EF4-FFF2-40B4-BE49-F238E27FC236}">
-                <a16:creationId xmlns:a16="http://schemas.microsoft.com/office/drawing/2014/main" id="{2C79D342-D943-4B62-A6EA-CA0BE1EF457F}"/>
-              </a:ext>
-            </a:extLst>
-          </p:cNvPr>
-          <p:cNvSpPr txBox="1"/>
-          <p:nvPr/>
-        </p:nvSpPr>
-        <p:spPr>
-          <a:xfrm>
-            <a:off x="7305964" y="5754255"/>
-            <a:ext cx="3860800" cy="369332"/>
-          </a:xfrm>
-          <a:prstGeom prst="rect">
-            <a:avLst/>
-          </a:prstGeom>
-          <a:noFill/>
-        </p:spPr>
-        <p:txBody>
-          <a:bodyPr wrap="square" rtlCol="0">
-            <a:spAutoFit/>
-          </a:bodyPr>
-          <a:lstStyle/>
-          <a:p>
-            <a:r>
-              <a:rPr lang="en-IN" dirty="0"/>
-              <a:t>Source: </a:t>
-            </a:r>
-            <a:r>
-              <a:rPr lang="en-IN" dirty="0" err="1"/>
-              <a:t>Yorko</a:t>
-            </a:r>
-            <a:r>
-              <a:rPr lang="en-IN" dirty="0"/>
-              <a:t> Open ML Course</a:t>
+              <a:rPr lang="en-IN" dirty="0">
+                <a:solidFill>
+                  <a:srgbClr val="FF0000"/>
+                </a:solidFill>
+                <a:hlinkClick r:id="rId2"/>
+              </a:rPr>
+              <a:t>https://live.yworks.com/demos/complete/decisiontree/</a:t>
+            </a:r>
+            <a:endParaRPr lang="en-IN" dirty="0">
+              <a:solidFill>
+                <a:srgbClr val="FF0000"/>
+              </a:solidFill>
+            </a:endParaRPr>
+          </a:p>
+          <a:p>
+            <a:r>
+              <a:rPr lang="en-IN" dirty="0">
+                <a:solidFill>
+                  <a:srgbClr val="FF0000"/>
+                </a:solidFill>
+              </a:rPr>
+              <a:t>http://www.r2d3.us/visual-intro-to-machine-learning-part-1/</a:t>
             </a:r>
           </a:p>
         </p:txBody>
@@ -8408,7 +8301,7 @@
     </p:spTree>
     <p:extLst>
       <p:ext uri="{BB962C8B-B14F-4D97-AF65-F5344CB8AC3E}">
-        <p14:creationId xmlns:p14="http://schemas.microsoft.com/office/powerpoint/2010/main" val="3689851703"/>
+        <p14:creationId xmlns:p14="http://schemas.microsoft.com/office/powerpoint/2010/main" val="1505914948"/>
       </p:ext>
     </p:extLst>
   </p:cSld>
@@ -8440,6 +8333,233 @@
           <p:cNvPr id="2" name="Title 1">
             <a:extLst>
               <a:ext uri="{FF2B5EF4-FFF2-40B4-BE49-F238E27FC236}">
+                <a16:creationId xmlns:a16="http://schemas.microsoft.com/office/drawing/2014/main" id="{655A93E0-30BA-4938-AC93-ECC71596C646}"/>
+              </a:ext>
+            </a:extLst>
+          </p:cNvPr>
+          <p:cNvSpPr>
+            <a:spLocks noGrp="1"/>
+          </p:cNvSpPr>
+          <p:nvPr>
+            <p:ph type="title"/>
+          </p:nvPr>
+        </p:nvSpPr>
+        <p:spPr>
+          <a:xfrm>
+            <a:off x="913774" y="184409"/>
+            <a:ext cx="10364451" cy="448284"/>
+          </a:xfrm>
+        </p:spPr>
+        <p:txBody>
+          <a:bodyPr>
+            <a:normAutofit fontScale="90000"/>
+          </a:bodyPr>
+          <a:lstStyle/>
+          <a:p>
+            <a:r>
+              <a:rPr lang="en-IN" dirty="0"/>
+              <a:t>Gradient boosting</a:t>
+            </a:r>
+          </a:p>
+        </p:txBody>
+      </p:sp>
+      <p:sp>
+        <p:nvSpPr>
+          <p:cNvPr id="3" name="Content Placeholder 2">
+            <a:extLst>
+              <a:ext uri="{FF2B5EF4-FFF2-40B4-BE49-F238E27FC236}">
+                <a16:creationId xmlns:a16="http://schemas.microsoft.com/office/drawing/2014/main" id="{1917E0A2-F82F-414B-AB00-2F600E66DF04}"/>
+              </a:ext>
+            </a:extLst>
+          </p:cNvPr>
+          <p:cNvSpPr>
+            <a:spLocks noGrp="1"/>
+          </p:cNvSpPr>
+          <p:nvPr>
+            <p:ph sz="quarter" idx="13"/>
+          </p:nvPr>
+        </p:nvSpPr>
+        <p:spPr>
+          <a:xfrm>
+            <a:off x="1006139" y="1066802"/>
+            <a:ext cx="4526444" cy="5407889"/>
+          </a:xfrm>
+        </p:spPr>
+        <p:txBody>
+          <a:bodyPr>
+            <a:normAutofit fontScale="85000" lnSpcReduction="20000"/>
+          </a:bodyPr>
+          <a:lstStyle/>
+          <a:p>
+            <a:r>
+              <a:rPr lang="en-US" dirty="0"/>
+              <a:t>Gradient Boosting works by sequentially adding predictors to an ensemble, each one correcting its predecessor.</a:t>
+            </a:r>
+          </a:p>
+          <a:p>
+            <a:r>
+              <a:rPr lang="en-US" dirty="0"/>
+              <a:t>instead of changing the weights for every incorrect classified observation at every iteration like AdaBoost, Gradient Boosting method tries to fit the new predictor to the residual errors made by the previous predictor.</a:t>
+            </a:r>
+          </a:p>
+          <a:p>
+            <a:r>
+              <a:rPr lang="en-US" dirty="0">
+                <a:solidFill>
+                  <a:schemeClr val="accent6">
+                    <a:lumMod val="50000"/>
+                  </a:schemeClr>
+                </a:solidFill>
+              </a:rPr>
+              <a:t>GBM uses Gradient Descent to find the shortcomings in the previous learner’s predictions. GBM algorithm can be given by following steps.</a:t>
+            </a:r>
+          </a:p>
+          <a:p>
+            <a:r>
+              <a:rPr lang="en-US" dirty="0">
+                <a:solidFill>
+                  <a:schemeClr val="accent6">
+                    <a:lumMod val="50000"/>
+                  </a:schemeClr>
+                </a:solidFill>
+              </a:rPr>
+              <a:t>Fit a model to the data, F1(x) = y</a:t>
+            </a:r>
+          </a:p>
+          <a:p>
+            <a:r>
+              <a:rPr lang="en-US" dirty="0">
+                <a:solidFill>
+                  <a:schemeClr val="accent6">
+                    <a:lumMod val="50000"/>
+                  </a:schemeClr>
+                </a:solidFill>
+              </a:rPr>
+              <a:t>Fit a model to the residuals, h1(x) = y−F1(x)</a:t>
+            </a:r>
+          </a:p>
+          <a:p>
+            <a:r>
+              <a:rPr lang="en-US" dirty="0">
+                <a:solidFill>
+                  <a:schemeClr val="accent6">
+                    <a:lumMod val="50000"/>
+                  </a:schemeClr>
+                </a:solidFill>
+              </a:rPr>
+              <a:t>Create a new model, F2(x) = F1(x) + h1(x)</a:t>
+            </a:r>
+            <a:endParaRPr lang="en-IN" dirty="0">
+              <a:solidFill>
+                <a:schemeClr val="accent6">
+                  <a:lumMod val="50000"/>
+                </a:schemeClr>
+              </a:solidFill>
+            </a:endParaRPr>
+          </a:p>
+        </p:txBody>
+      </p:sp>
+      <p:sp>
+        <p:nvSpPr>
+          <p:cNvPr id="6" name="TextBox 5">
+            <a:extLst>
+              <a:ext uri="{FF2B5EF4-FFF2-40B4-BE49-F238E27FC236}">
+                <a16:creationId xmlns:a16="http://schemas.microsoft.com/office/drawing/2014/main" id="{D5C94A61-8BCA-4452-97DC-456202288AFF}"/>
+              </a:ext>
+            </a:extLst>
+          </p:cNvPr>
+          <p:cNvSpPr txBox="1"/>
+          <p:nvPr/>
+        </p:nvSpPr>
+        <p:spPr>
+          <a:xfrm>
+            <a:off x="701964" y="6568824"/>
+            <a:ext cx="9929090" cy="253916"/>
+          </a:xfrm>
+          <a:prstGeom prst="rect">
+            <a:avLst/>
+          </a:prstGeom>
+          <a:noFill/>
+        </p:spPr>
+        <p:txBody>
+          <a:bodyPr wrap="square">
+            <a:spAutoFit/>
+          </a:bodyPr>
+          <a:lstStyle/>
+          <a:p>
+            <a:pPr algn="ctr"/>
+            <a:r>
+              <a:rPr lang="en-IN" sz="1050" dirty="0"/>
+              <a:t>Source: https://medium.com/greyatom/a-quick-guide-to-boosting-in-ml-acf7c1585cb5#:~:text=What%20is%20Boosting%3F,trying%20to%20correct%20its%20predecessor.</a:t>
+            </a:r>
+          </a:p>
+        </p:txBody>
+      </p:sp>
+      <p:pic>
+        <p:nvPicPr>
+          <p:cNvPr id="5" name="Picture 4">
+            <a:extLst>
+              <a:ext uri="{FF2B5EF4-FFF2-40B4-BE49-F238E27FC236}">
+                <a16:creationId xmlns:a16="http://schemas.microsoft.com/office/drawing/2014/main" id="{00D54761-6936-408D-B5F1-A61DD51C40DE}"/>
+              </a:ext>
+            </a:extLst>
+          </p:cNvPr>
+          <p:cNvPicPr>
+            <a:picLocks noChangeAspect="1"/>
+          </p:cNvPicPr>
+          <p:nvPr/>
+        </p:nvPicPr>
+        <p:blipFill>
+          <a:blip r:embed="rId2"/>
+          <a:stretch>
+            <a:fillRect/>
+          </a:stretch>
+        </p:blipFill>
+        <p:spPr>
+          <a:xfrm>
+            <a:off x="5689600" y="1066802"/>
+            <a:ext cx="6373091" cy="3543300"/>
+          </a:xfrm>
+          <a:prstGeom prst="rect">
+            <a:avLst/>
+          </a:prstGeom>
+        </p:spPr>
+      </p:pic>
+    </p:spTree>
+    <p:extLst>
+      <p:ext uri="{BB962C8B-B14F-4D97-AF65-F5344CB8AC3E}">
+        <p14:creationId xmlns:p14="http://schemas.microsoft.com/office/powerpoint/2010/main" val="3333535548"/>
+      </p:ext>
+    </p:extLst>
+  </p:cSld>
+  <p:clrMapOvr>
+    <a:masterClrMapping/>
+  </p:clrMapOvr>
+</p:sld>
+</file>
+
+<file path=ppt/slides/slide21.xml><?xml version="1.0" encoding="utf-8"?>
+<p:sld xmlns:a="http://schemas.openxmlformats.org/drawingml/2006/main" xmlns:r="http://schemas.openxmlformats.org/officeDocument/2006/relationships" xmlns:p="http://schemas.openxmlformats.org/presentationml/2006/main">
+  <p:cSld>
+    <p:spTree>
+      <p:nvGrpSpPr>
+        <p:cNvPr id="1" name=""/>
+        <p:cNvGrpSpPr/>
+        <p:nvPr/>
+      </p:nvGrpSpPr>
+      <p:grpSpPr>
+        <a:xfrm>
+          <a:off x="0" y="0"/>
+          <a:ext cx="0" cy="0"/>
+          <a:chOff x="0" y="0"/>
+          <a:chExt cx="0" cy="0"/>
+        </a:xfrm>
+      </p:grpSpPr>
+      <p:sp>
+        <p:nvSpPr>
+          <p:cNvPr id="2" name="Title 1">
+            <a:extLst>
+              <a:ext uri="{FF2B5EF4-FFF2-40B4-BE49-F238E27FC236}">
                 <a16:creationId xmlns:a16="http://schemas.microsoft.com/office/drawing/2014/main" id="{0D9F3E1E-4347-4C2F-8E8B-3D3582A4273C}"/>
               </a:ext>
             </a:extLst>
@@ -8646,7 +8766,7 @@
 </p:sld>
 </file>
 
-<file path=ppt/slides/slide21.xml><?xml version="1.0" encoding="utf-8"?>
+<file path=ppt/slides/slide22.xml><?xml version="1.0" encoding="utf-8"?>
 <p:sld xmlns:a="http://schemas.openxmlformats.org/drawingml/2006/main" xmlns:r="http://schemas.openxmlformats.org/officeDocument/2006/relationships" xmlns:p="http://schemas.openxmlformats.org/presentationml/2006/main">
   <p:cSld>
     <p:spTree>
@@ -8763,7 +8883,7 @@
           <p:cNvPr id="2" name="Title 1">
             <a:extLst>
               <a:ext uri="{FF2B5EF4-FFF2-40B4-BE49-F238E27FC236}">
-                <a16:creationId xmlns:a16="http://schemas.microsoft.com/office/drawing/2014/main" id="{167FA17E-27E0-4C6B-8E9E-0D29EC2F2671}"/>
+                <a16:creationId xmlns:a16="http://schemas.microsoft.com/office/drawing/2014/main" id="{1C4809CD-D024-4DEA-9966-DFBB0BA07CCA}"/>
               </a:ext>
             </a:extLst>
           </p:cNvPr>
@@ -8776,8 +8896,8 @@
         </p:nvSpPr>
         <p:spPr>
           <a:xfrm>
-            <a:off x="470429" y="219362"/>
-            <a:ext cx="10364451" cy="217057"/>
+            <a:off x="913775" y="618518"/>
+            <a:ext cx="10364451" cy="582210"/>
           </a:xfrm>
         </p:spPr>
         <p:txBody>
@@ -8787,14 +8907,53 @@
           <a:lstStyle/>
           <a:p>
             <a:r>
-              <a:rPr lang="en-US" b="1" i="0" dirty="0">
-                <a:solidFill>
-                  <a:srgbClr val="000000"/>
-                </a:solidFill>
-                <a:effectLst/>
-                <a:latin typeface="Helvetica Neue"/>
-              </a:rPr>
-              <a:t>Terminology</a:t>
+              <a:rPr lang="en-IN" dirty="0"/>
+              <a:t>What is a decision Tree</a:t>
+            </a:r>
+          </a:p>
+        </p:txBody>
+      </p:sp>
+      <p:sp>
+        <p:nvSpPr>
+          <p:cNvPr id="3" name="Content Placeholder 2">
+            <a:extLst>
+              <a:ext uri="{FF2B5EF4-FFF2-40B4-BE49-F238E27FC236}">
+                <a16:creationId xmlns:a16="http://schemas.microsoft.com/office/drawing/2014/main" id="{945078C4-2CBE-4031-9EA8-EB074881424B}"/>
+              </a:ext>
+            </a:extLst>
+          </p:cNvPr>
+          <p:cNvSpPr>
+            <a:spLocks noGrp="1"/>
+          </p:cNvSpPr>
+          <p:nvPr>
+            <p:ph sz="quarter" idx="13"/>
+          </p:nvPr>
+        </p:nvSpPr>
+        <p:spPr>
+          <a:xfrm>
+            <a:off x="913774" y="1200728"/>
+            <a:ext cx="4997499" cy="5504872"/>
+          </a:xfrm>
+        </p:spPr>
+        <p:txBody>
+          <a:bodyPr/>
+          <a:lstStyle/>
+          <a:p>
+            <a:r>
+              <a:rPr lang="en-US" dirty="0"/>
+              <a:t>A decision tree is often a generalization of the experts' experience, a means of sharing knowledge of a particular process. </a:t>
+            </a:r>
+          </a:p>
+          <a:p>
+            <a:r>
+              <a:rPr lang="en-US" dirty="0"/>
+              <a:t>For example, before the introduction of scalable machine learning algorithms, the credit scoring task in the banking sector was solved by experts. </a:t>
+            </a:r>
+          </a:p>
+          <a:p>
+            <a:r>
+              <a:rPr lang="en-US" dirty="0"/>
+              <a:t>The decision to grant a loan was made on the basis of some intuitively (or empirically) derived rules that could be represented as a decision tree.</a:t>
             </a:r>
             <a:endParaRPr lang="en-IN" dirty="0"/>
           </a:p>
@@ -8805,7 +8964,7 @@
           <p:cNvPr id="4" name="Picture 3">
             <a:extLst>
               <a:ext uri="{FF2B5EF4-FFF2-40B4-BE49-F238E27FC236}">
-                <a16:creationId xmlns:a16="http://schemas.microsoft.com/office/drawing/2014/main" id="{D8A3EB0C-A891-4512-A5B1-0D875A2B9B02}"/>
+                <a16:creationId xmlns:a16="http://schemas.microsoft.com/office/drawing/2014/main" id="{47762C11-41D3-4E90-8A0C-750AE1C10C87}"/>
               </a:ext>
             </a:extLst>
           </p:cNvPr>
@@ -8822,8 +8981,8 @@
         </p:blipFill>
         <p:spPr>
           <a:xfrm>
-            <a:off x="1690255" y="561502"/>
-            <a:ext cx="8811490" cy="5002656"/>
+            <a:off x="6280729" y="1200728"/>
+            <a:ext cx="5514109" cy="4343400"/>
           </a:xfrm>
           <a:prstGeom prst="rect">
             <a:avLst/>
@@ -8835,7 +8994,7 @@
           <p:cNvPr id="5" name="TextBox 4">
             <a:extLst>
               <a:ext uri="{FF2B5EF4-FFF2-40B4-BE49-F238E27FC236}">
-                <a16:creationId xmlns:a16="http://schemas.microsoft.com/office/drawing/2014/main" id="{51FA1A50-7058-45B1-A2C9-BBAB03E741DB}"/>
+                <a16:creationId xmlns:a16="http://schemas.microsoft.com/office/drawing/2014/main" id="{2C79D342-D943-4B62-A6EA-CA0BE1EF457F}"/>
               </a:ext>
             </a:extLst>
           </p:cNvPr>
@@ -8844,8 +9003,8 @@
         </p:nvSpPr>
         <p:spPr>
           <a:xfrm>
-            <a:off x="3916218" y="5698836"/>
-            <a:ext cx="2918691" cy="369332"/>
+            <a:off x="7305964" y="5754255"/>
+            <a:ext cx="3860800" cy="369332"/>
           </a:xfrm>
           <a:prstGeom prst="rect">
             <a:avLst/>
@@ -8860,7 +9019,15 @@
           <a:p>
             <a:r>
               <a:rPr lang="en-IN" dirty="0"/>
-              <a:t>Source: Analytics Vidhya</a:t>
+              <a:t>Source: </a:t>
+            </a:r>
+            <a:r>
+              <a:rPr lang="en-IN" dirty="0" err="1"/>
+              <a:t>Yorko</a:t>
+            </a:r>
+            <a:r>
+              <a:rPr lang="en-IN" dirty="0"/>
+              <a:t> Open ML Course</a:t>
             </a:r>
           </a:p>
         </p:txBody>
@@ -8868,7 +9035,7 @@
     </p:spTree>
     <p:extLst>
       <p:ext uri="{BB962C8B-B14F-4D97-AF65-F5344CB8AC3E}">
-        <p14:creationId xmlns:p14="http://schemas.microsoft.com/office/powerpoint/2010/main" val="2809943610"/>
+        <p14:creationId xmlns:p14="http://schemas.microsoft.com/office/powerpoint/2010/main" val="3689851703"/>
       </p:ext>
     </p:extLst>
   </p:cSld>
@@ -8900,7 +9067,7 @@
           <p:cNvPr id="2" name="Title 1">
             <a:extLst>
               <a:ext uri="{FF2B5EF4-FFF2-40B4-BE49-F238E27FC236}">
-                <a16:creationId xmlns:a16="http://schemas.microsoft.com/office/drawing/2014/main" id="{1AEADCA6-B4DF-4AA5-9054-5B58E46F820B}"/>
+                <a16:creationId xmlns:a16="http://schemas.microsoft.com/office/drawing/2014/main" id="{167FA17E-27E0-4C6B-8E9E-0D29EC2F2671}"/>
               </a:ext>
             </a:extLst>
           </p:cNvPr>
@@ -8913,8 +9080,8 @@
         </p:nvSpPr>
         <p:spPr>
           <a:xfrm>
-            <a:off x="913774" y="268712"/>
-            <a:ext cx="10364451" cy="525615"/>
+            <a:off x="470429" y="219362"/>
+            <a:ext cx="10364451" cy="217057"/>
           </a:xfrm>
         </p:spPr>
         <p:txBody>
@@ -8924,287 +9091,55 @@
           <a:lstStyle/>
           <a:p>
             <a:r>
-              <a:rPr lang="en-IN" dirty="0"/>
-              <a:t>Types of nodes</a:t>
-            </a:r>
-          </a:p>
-        </p:txBody>
-      </p:sp>
-      <p:sp>
-        <p:nvSpPr>
-          <p:cNvPr id="3" name="Content Placeholder 2">
+              <a:rPr lang="en-US" b="1" i="0" dirty="0">
+                <a:solidFill>
+                  <a:srgbClr val="000000"/>
+                </a:solidFill>
+                <a:effectLst/>
+                <a:latin typeface="Helvetica Neue"/>
+              </a:rPr>
+              <a:t>Terminology</a:t>
+            </a:r>
+            <a:endParaRPr lang="en-IN" dirty="0"/>
+          </a:p>
+        </p:txBody>
+      </p:sp>
+      <p:pic>
+        <p:nvPicPr>
+          <p:cNvPr id="4" name="Picture 3">
             <a:extLst>
               <a:ext uri="{FF2B5EF4-FFF2-40B4-BE49-F238E27FC236}">
-                <a16:creationId xmlns:a16="http://schemas.microsoft.com/office/drawing/2014/main" id="{9EB60A50-381B-4094-BE6E-C39D3FEF631C}"/>
+                <a16:creationId xmlns:a16="http://schemas.microsoft.com/office/drawing/2014/main" id="{D8A3EB0C-A891-4512-A5B1-0D875A2B9B02}"/>
               </a:ext>
             </a:extLst>
           </p:cNvPr>
-          <p:cNvSpPr>
-            <a:spLocks noGrp="1"/>
-          </p:cNvSpPr>
-          <p:nvPr>
-            <p:ph sz="quarter" idx="13"/>
-          </p:nvPr>
-        </p:nvSpPr>
-        <p:spPr>
-          <a:xfrm>
-            <a:off x="913774" y="794328"/>
-            <a:ext cx="10363826" cy="4996872"/>
-          </a:xfrm>
-        </p:spPr>
-        <p:txBody>
-          <a:bodyPr>
-            <a:normAutofit fontScale="70000" lnSpcReduction="20000"/>
-          </a:bodyPr>
-          <a:lstStyle/>
-          <a:p>
-            <a:pPr algn="l">
-              <a:buFont typeface="Arial" panose="020B0604020202020204" pitchFamily="34" charset="0"/>
-              <a:buChar char="•"/>
-            </a:pPr>
-            <a:r>
-              <a:rPr lang="en-US" b="1" i="0" dirty="0">
-                <a:solidFill>
-                  <a:srgbClr val="333333"/>
-                </a:solidFill>
-                <a:effectLst/>
-                <a:latin typeface="roboto"/>
-              </a:rPr>
-              <a:t>Parent node</a:t>
-            </a:r>
-            <a:r>
-              <a:rPr lang="en-US" b="0" i="0" dirty="0">
-                <a:solidFill>
-                  <a:srgbClr val="595858"/>
-                </a:solidFill>
-                <a:effectLst/>
-                <a:latin typeface="roboto"/>
-              </a:rPr>
-              <a:t>: In any two connected nodes, the one which is higher hierarchically, is a parent node.</a:t>
-            </a:r>
-          </a:p>
-          <a:p>
-            <a:pPr algn="l">
-              <a:buFont typeface="Arial" panose="020B0604020202020204" pitchFamily="34" charset="0"/>
-              <a:buChar char="•"/>
-            </a:pPr>
-            <a:r>
-              <a:rPr lang="en-US" b="1" i="0" dirty="0">
-                <a:solidFill>
-                  <a:srgbClr val="333333"/>
-                </a:solidFill>
-                <a:effectLst/>
-                <a:latin typeface="roboto"/>
-              </a:rPr>
-              <a:t>Child node</a:t>
-            </a:r>
-            <a:r>
-              <a:rPr lang="en-US" b="0" i="0" dirty="0">
-                <a:solidFill>
-                  <a:srgbClr val="595858"/>
-                </a:solidFill>
-                <a:effectLst/>
-                <a:latin typeface="roboto"/>
-              </a:rPr>
-              <a:t>: In any two connected nodes, the one which is lower hierarchically, is a child node.</a:t>
-            </a:r>
-          </a:p>
-          <a:p>
-            <a:pPr algn="l">
-              <a:buFont typeface="Arial" panose="020B0604020202020204" pitchFamily="34" charset="0"/>
-              <a:buChar char="•"/>
-            </a:pPr>
-            <a:r>
-              <a:rPr lang="en-US" b="1" i="0" dirty="0">
-                <a:solidFill>
-                  <a:srgbClr val="333333"/>
-                </a:solidFill>
-                <a:effectLst/>
-                <a:latin typeface="roboto"/>
-              </a:rPr>
-              <a:t>Root node</a:t>
-            </a:r>
-            <a:r>
-              <a:rPr lang="en-US" b="0" i="0" dirty="0">
-                <a:solidFill>
-                  <a:srgbClr val="595858"/>
-                </a:solidFill>
-                <a:effectLst/>
-                <a:latin typeface="roboto"/>
-              </a:rPr>
-              <a:t>: Starting node from which the tree starts, It has only child nodes. The root node does not have a parent node. (dark blue node in the above image)</a:t>
-            </a:r>
-          </a:p>
-          <a:p>
-            <a:pPr algn="l">
-              <a:buFont typeface="Arial" panose="020B0604020202020204" pitchFamily="34" charset="0"/>
-              <a:buChar char="•"/>
-            </a:pPr>
-            <a:r>
-              <a:rPr lang="en-US" b="1" i="0" dirty="0">
-                <a:solidFill>
-                  <a:srgbClr val="333333"/>
-                </a:solidFill>
-                <a:effectLst/>
-                <a:latin typeface="roboto"/>
-              </a:rPr>
-              <a:t>Leaf Node/leaf: </a:t>
-            </a:r>
-            <a:r>
-              <a:rPr lang="en-US" b="0" i="0" dirty="0">
-                <a:solidFill>
-                  <a:srgbClr val="595858"/>
-                </a:solidFill>
-                <a:effectLst/>
-                <a:latin typeface="roboto"/>
-              </a:rPr>
-              <a:t>Nodes at the end of the tree, which do not have any children are leaf nodes or called simply leaf. (green nodes in the above image)</a:t>
-            </a:r>
-          </a:p>
-          <a:p>
-            <a:pPr algn="l">
-              <a:buFont typeface="Arial" panose="020B0604020202020204" pitchFamily="34" charset="0"/>
-              <a:buChar char="•"/>
-            </a:pPr>
-            <a:r>
-              <a:rPr lang="en-US" b="1" i="0" dirty="0">
-                <a:solidFill>
-                  <a:srgbClr val="333333"/>
-                </a:solidFill>
-                <a:effectLst/>
-                <a:latin typeface="roboto"/>
-              </a:rPr>
-              <a:t>Internal nodes/nodes</a:t>
-            </a:r>
-            <a:r>
-              <a:rPr lang="en-US" b="0" i="0" dirty="0">
-                <a:solidFill>
-                  <a:srgbClr val="595858"/>
-                </a:solidFill>
-                <a:effectLst/>
-                <a:latin typeface="roboto"/>
-              </a:rPr>
-              <a:t>: All the in-between the root node and the leaf nodes are internal nodes or simply called nodes. internal nodes have both a parent and at least one child. (red nodes in the above image)</a:t>
-            </a:r>
-          </a:p>
-          <a:p>
-            <a:pPr algn="l">
-              <a:buFont typeface="Arial" panose="020B0604020202020204" pitchFamily="34" charset="0"/>
-              <a:buChar char="•"/>
-            </a:pPr>
-            <a:r>
-              <a:rPr lang="en-US" b="1" i="0" dirty="0">
-                <a:solidFill>
-                  <a:srgbClr val="333333"/>
-                </a:solidFill>
-                <a:effectLst/>
-                <a:latin typeface="roboto"/>
-              </a:rPr>
-              <a:t>Splitting</a:t>
-            </a:r>
-            <a:r>
-              <a:rPr lang="en-US" b="0" i="0" dirty="0">
-                <a:solidFill>
-                  <a:srgbClr val="595858"/>
-                </a:solidFill>
-                <a:effectLst/>
-                <a:latin typeface="roboto"/>
-              </a:rPr>
-              <a:t>: Dividing a node in two or more sun-nodes or adding two or more children to a node.</a:t>
-            </a:r>
-          </a:p>
-          <a:p>
-            <a:pPr algn="l">
-              <a:buFont typeface="Arial" panose="020B0604020202020204" pitchFamily="34" charset="0"/>
-              <a:buChar char="•"/>
-            </a:pPr>
-            <a:r>
-              <a:rPr lang="en-US" b="1" i="0" dirty="0">
-                <a:solidFill>
-                  <a:srgbClr val="333333"/>
-                </a:solidFill>
-                <a:effectLst/>
-                <a:latin typeface="roboto"/>
-              </a:rPr>
-              <a:t>Decision node</a:t>
-            </a:r>
-            <a:r>
-              <a:rPr lang="en-US" b="0" i="0" dirty="0">
-                <a:solidFill>
-                  <a:srgbClr val="595858"/>
-                </a:solidFill>
-                <a:effectLst/>
-                <a:latin typeface="roboto"/>
-              </a:rPr>
-              <a:t>: when a parent splits into two or more children nodes then that node is called a decision node.</a:t>
-            </a:r>
-          </a:p>
-          <a:p>
-            <a:pPr algn="l">
-              <a:buFont typeface="Arial" panose="020B0604020202020204" pitchFamily="34" charset="0"/>
-              <a:buChar char="•"/>
-            </a:pPr>
-            <a:r>
-              <a:rPr lang="en-US" b="1" i="0" dirty="0">
-                <a:solidFill>
-                  <a:srgbClr val="333333"/>
-                </a:solidFill>
-                <a:effectLst/>
-                <a:latin typeface="roboto"/>
-              </a:rPr>
-              <a:t>Pruning: </a:t>
-            </a:r>
-            <a:r>
-              <a:rPr lang="en-US" b="0" i="0" dirty="0">
-                <a:solidFill>
-                  <a:srgbClr val="595858"/>
-                </a:solidFill>
-                <a:effectLst/>
-                <a:latin typeface="roboto"/>
-              </a:rPr>
-              <a:t>When we remove the sub-node of a decision node, it is called pruning. You can understand it as the opposite process of splitting.</a:t>
-            </a:r>
-          </a:p>
-          <a:p>
-            <a:pPr algn="l">
-              <a:buFont typeface="Arial" panose="020B0604020202020204" pitchFamily="34" charset="0"/>
-              <a:buChar char="•"/>
-            </a:pPr>
-            <a:r>
-              <a:rPr lang="en-US" b="1" i="0" dirty="0">
-                <a:solidFill>
-                  <a:srgbClr val="333333"/>
-                </a:solidFill>
-                <a:effectLst/>
-                <a:latin typeface="roboto"/>
-              </a:rPr>
-              <a:t>Branch/Sub-tree</a:t>
-            </a:r>
-            <a:r>
-              <a:rPr lang="en-US" b="0" i="0" dirty="0">
-                <a:solidFill>
-                  <a:srgbClr val="595858"/>
-                </a:solidFill>
-                <a:effectLst/>
-                <a:latin typeface="roboto"/>
-              </a:rPr>
-              <a:t>: a subsection of the entire tree is called a branch or sub-tree.</a:t>
-            </a:r>
-          </a:p>
-          <a:p>
-            <a:pPr marL="0" indent="0">
-              <a:buNone/>
-            </a:pPr>
-            <a:endParaRPr lang="en-IN" dirty="0"/>
-          </a:p>
-        </p:txBody>
-      </p:sp>
+          <p:cNvPicPr>
+            <a:picLocks noChangeAspect="1"/>
+          </p:cNvPicPr>
+          <p:nvPr/>
+        </p:nvPicPr>
+        <p:blipFill>
+          <a:blip r:embed="rId2"/>
+          <a:stretch>
+            <a:fillRect/>
+          </a:stretch>
+        </p:blipFill>
+        <p:spPr>
+          <a:xfrm>
+            <a:off x="1690255" y="561502"/>
+            <a:ext cx="8811490" cy="5002656"/>
+          </a:xfrm>
+          <a:prstGeom prst="rect">
+            <a:avLst/>
+          </a:prstGeom>
+        </p:spPr>
+      </p:pic>
       <p:sp>
         <p:nvSpPr>
           <p:cNvPr id="5" name="TextBox 4">
             <a:extLst>
               <a:ext uri="{FF2B5EF4-FFF2-40B4-BE49-F238E27FC236}">
-                <a16:creationId xmlns:a16="http://schemas.microsoft.com/office/drawing/2014/main" id="{04696FEE-2F40-4C65-B25A-D5B61ABCF255}"/>
+                <a16:creationId xmlns:a16="http://schemas.microsoft.com/office/drawing/2014/main" id="{51FA1A50-7058-45B1-A2C9-BBAB03E741DB}"/>
               </a:ext>
             </a:extLst>
           </p:cNvPr>
@@ -9213,8 +9148,8 @@
         </p:nvSpPr>
         <p:spPr>
           <a:xfrm>
-            <a:off x="2724728" y="5763491"/>
-            <a:ext cx="6096000" cy="369332"/>
+            <a:off x="3916218" y="5698836"/>
+            <a:ext cx="2918691" cy="369332"/>
           </a:xfrm>
           <a:prstGeom prst="rect">
             <a:avLst/>
@@ -9222,12 +9157,11 @@
           <a:noFill/>
         </p:spPr>
         <p:txBody>
-          <a:bodyPr wrap="square">
+          <a:bodyPr wrap="square" rtlCol="0">
             <a:spAutoFit/>
           </a:bodyPr>
           <a:lstStyle/>
           <a:p>
-            <a:pPr algn="ctr"/>
             <a:r>
               <a:rPr lang="en-IN" dirty="0"/>
               <a:t>Source: Analytics Vidhya</a:t>
@@ -9238,7 +9172,7 @@
     </p:spTree>
     <p:extLst>
       <p:ext uri="{BB962C8B-B14F-4D97-AF65-F5344CB8AC3E}">
-        <p14:creationId xmlns:p14="http://schemas.microsoft.com/office/powerpoint/2010/main" val="395229379"/>
+        <p14:creationId xmlns:p14="http://schemas.microsoft.com/office/powerpoint/2010/main" val="2809943610"/>
       </p:ext>
     </p:extLst>
   </p:cSld>
@@ -9295,7 +9229,7 @@
           <a:p>
             <a:r>
               <a:rPr lang="en-IN" dirty="0"/>
-              <a:t>How Do You Create a decision tree?</a:t>
+              <a:t>Types of nodes</a:t>
             </a:r>
           </a:p>
         </p:txBody>
@@ -9319,12 +9253,12 @@
         <p:spPr>
           <a:xfrm>
             <a:off x="913774" y="794328"/>
-            <a:ext cx="10363826" cy="4294908"/>
+            <a:ext cx="10363826" cy="4996872"/>
           </a:xfrm>
         </p:spPr>
         <p:txBody>
           <a:bodyPr>
-            <a:normAutofit/>
+            <a:normAutofit fontScale="70000" lnSpcReduction="20000"/>
           </a:bodyPr>
           <a:lstStyle/>
           <a:p>
@@ -9333,13 +9267,24 @@
               <a:buChar char="•"/>
             </a:pPr>
             <a:r>
-              <a:rPr lang="en-US" dirty="0">
-                <a:solidFill>
-                  <a:srgbClr val="595858"/>
-                </a:solidFill>
+              <a:rPr lang="en-US" b="1" i="0" dirty="0">
+                <a:solidFill>
+                  <a:srgbClr val="333333"/>
+                </a:solidFill>
+                <a:effectLst/>
                 <a:latin typeface="roboto"/>
               </a:rPr>
-              <a:t>Biggest question. Where do you start from?</a:t>
+              <a:t>Parent node</a:t>
+            </a:r>
+            <a:r>
+              <a:rPr lang="en-US" b="0" i="0" dirty="0">
+                <a:solidFill>
+                  <a:srgbClr val="595858"/>
+                </a:solidFill>
+                <a:effectLst/>
+                <a:latin typeface="roboto"/>
+              </a:rPr>
+              <a:t>: In any two connected nodes, the one which is higher hierarchically, is a parent node.</a:t>
             </a:r>
           </a:p>
           <a:p>
@@ -9348,23 +9293,24 @@
               <a:buChar char="•"/>
             </a:pPr>
             <a:r>
-              <a:rPr lang="en-US" b="0" i="0" dirty="0">
-                <a:solidFill>
-                  <a:srgbClr val="595858"/>
+              <a:rPr lang="en-US" b="1" i="0" dirty="0">
+                <a:solidFill>
+                  <a:srgbClr val="333333"/>
                 </a:solidFill>
                 <a:effectLst/>
                 <a:latin typeface="roboto"/>
               </a:rPr>
-              <a:t>We cant arbitrarily choose a root node</a:t>
-            </a:r>
-            <a:r>
-              <a:rPr lang="en-US" dirty="0">
+              <a:t>Child node</a:t>
+            </a:r>
+            <a:r>
+              <a:rPr lang="en-US" b="0" i="0" dirty="0">
                 <a:solidFill>
                   <a:srgbClr val="595858"/>
                 </a:solidFill>
+                <a:effectLst/>
                 <a:latin typeface="roboto"/>
               </a:rPr>
-              <a:t>. So how we decide what should be our root node? Which feature do we look at to make the first split?</a:t>
+              <a:t>: In any two connected nodes, the one which is lower hierarchically, is a child node.</a:t>
             </a:r>
           </a:p>
           <a:p>
@@ -9373,41 +9319,24 @@
               <a:buChar char="•"/>
             </a:pPr>
             <a:r>
-              <a:rPr lang="en-US" b="0" i="0" dirty="0">
-                <a:solidFill>
-                  <a:srgbClr val="595858"/>
+              <a:rPr lang="en-US" b="1" i="0" dirty="0">
+                <a:solidFill>
+                  <a:srgbClr val="333333"/>
                 </a:solidFill>
                 <a:effectLst/>
                 <a:latin typeface="roboto"/>
               </a:rPr>
-              <a:t>Think o</a:t>
-            </a:r>
-            <a:r>
-              <a:rPr lang="en-US" dirty="0">
+              <a:t>Root node</a:t>
+            </a:r>
+            <a:r>
+              <a:rPr lang="en-US" b="0" i="0" dirty="0">
                 <a:solidFill>
                   <a:srgbClr val="595858"/>
                 </a:solidFill>
+                <a:effectLst/>
                 <a:latin typeface="roboto"/>
               </a:rPr>
-              <a:t>f the game </a:t>
-            </a:r>
-            <a:r>
-              <a:rPr lang="en-US" b="1" dirty="0">
-                <a:solidFill>
-                  <a:srgbClr val="595858"/>
-                </a:solidFill>
-                <a:latin typeface="roboto"/>
-              </a:rPr>
-              <a:t>‘GUESS the CELEBRITY’. </a:t>
-            </a:r>
-            <a:r>
-              <a:rPr lang="en-US" dirty="0">
-                <a:solidFill>
-                  <a:srgbClr val="595858"/>
-                </a:solidFill>
-                <a:latin typeface="roboto"/>
-              </a:rPr>
-              <a:t>You have 20 questions to guess the celebrity I am thinking of. </a:t>
+              <a:t>: Starting node from which the tree starts, It has only child nodes. The root node does not have a parent node. (dark blue node in the above image)</a:t>
             </a:r>
           </a:p>
           <a:p>
@@ -9416,23 +9345,24 @@
               <a:buChar char="•"/>
             </a:pPr>
             <a:r>
-              <a:rPr lang="en-US" b="0" i="0" dirty="0">
-                <a:solidFill>
-                  <a:srgbClr val="595858"/>
+              <a:rPr lang="en-US" b="1" i="0" dirty="0">
+                <a:solidFill>
+                  <a:srgbClr val="333333"/>
                 </a:solidFill>
                 <a:effectLst/>
                 <a:latin typeface="roboto"/>
               </a:rPr>
-              <a:t>I will only answer in yes or no</a:t>
-            </a:r>
-            <a:r>
-              <a:rPr lang="en-US" dirty="0">
+              <a:t>Leaf Node/leaf: </a:t>
+            </a:r>
+            <a:r>
+              <a:rPr lang="en-US" b="0" i="0" dirty="0">
                 <a:solidFill>
                   <a:srgbClr val="595858"/>
                 </a:solidFill>
+                <a:effectLst/>
                 <a:latin typeface="roboto"/>
               </a:rPr>
-              <a:t>’s. Then you ask the next question.</a:t>
+              <a:t>Nodes at the end of the tree, which do not have any children are leaf nodes or called simply leaf. (green nodes in the above image)</a:t>
             </a:r>
           </a:p>
           <a:p>
@@ -9441,24 +9371,128 @@
               <a:buChar char="•"/>
             </a:pPr>
             <a:r>
-              <a:rPr lang="en-US" b="0" i="0" dirty="0">
-                <a:solidFill>
-                  <a:srgbClr val="595858"/>
+              <a:rPr lang="en-US" b="1" i="0" dirty="0">
+                <a:solidFill>
+                  <a:srgbClr val="333333"/>
                 </a:solidFill>
                 <a:effectLst/>
                 <a:latin typeface="roboto"/>
               </a:rPr>
-              <a:t>Obviously the first question should tell you most about a celebrity. So the first question should be if the person is a male or a female as this gives us </a:t>
-            </a:r>
-            <a:r>
-              <a:rPr lang="en-US" b="1" i="0" dirty="0">
+              <a:t>Internal nodes/nodes</a:t>
+            </a:r>
+            <a:r>
+              <a:rPr lang="en-US" b="0" i="0" dirty="0">
                 <a:solidFill>
                   <a:srgbClr val="595858"/>
                 </a:solidFill>
                 <a:effectLst/>
                 <a:latin typeface="roboto"/>
               </a:rPr>
-              <a:t>maximum information gain.</a:t>
+              <a:t>: All the in-between the root node and the leaf nodes are internal nodes or simply called nodes. internal nodes have both a parent and at least one child. (red nodes in the above image)</a:t>
+            </a:r>
+          </a:p>
+          <a:p>
+            <a:pPr algn="l">
+              <a:buFont typeface="Arial" panose="020B0604020202020204" pitchFamily="34" charset="0"/>
+              <a:buChar char="•"/>
+            </a:pPr>
+            <a:r>
+              <a:rPr lang="en-US" b="1" i="0" dirty="0">
+                <a:solidFill>
+                  <a:srgbClr val="333333"/>
+                </a:solidFill>
+                <a:effectLst/>
+                <a:latin typeface="roboto"/>
+              </a:rPr>
+              <a:t>Splitting</a:t>
+            </a:r>
+            <a:r>
+              <a:rPr lang="en-US" b="0" i="0" dirty="0">
+                <a:solidFill>
+                  <a:srgbClr val="595858"/>
+                </a:solidFill>
+                <a:effectLst/>
+                <a:latin typeface="roboto"/>
+              </a:rPr>
+              <a:t>: Dividing a node in two or more sun-nodes or adding two or more children to a node.</a:t>
+            </a:r>
+          </a:p>
+          <a:p>
+            <a:pPr algn="l">
+              <a:buFont typeface="Arial" panose="020B0604020202020204" pitchFamily="34" charset="0"/>
+              <a:buChar char="•"/>
+            </a:pPr>
+            <a:r>
+              <a:rPr lang="en-US" b="1" i="0" dirty="0">
+                <a:solidFill>
+                  <a:srgbClr val="333333"/>
+                </a:solidFill>
+                <a:effectLst/>
+                <a:latin typeface="roboto"/>
+              </a:rPr>
+              <a:t>Decision node</a:t>
+            </a:r>
+            <a:r>
+              <a:rPr lang="en-US" b="0" i="0" dirty="0">
+                <a:solidFill>
+                  <a:srgbClr val="595858"/>
+                </a:solidFill>
+                <a:effectLst/>
+                <a:latin typeface="roboto"/>
+              </a:rPr>
+              <a:t>: when a parent splits into two or more children nodes then that node is called a decision node.</a:t>
+            </a:r>
+          </a:p>
+          <a:p>
+            <a:pPr algn="l">
+              <a:buFont typeface="Arial" panose="020B0604020202020204" pitchFamily="34" charset="0"/>
+              <a:buChar char="•"/>
+            </a:pPr>
+            <a:r>
+              <a:rPr lang="en-US" b="1" i="0" dirty="0">
+                <a:solidFill>
+                  <a:srgbClr val="333333"/>
+                </a:solidFill>
+                <a:effectLst/>
+                <a:latin typeface="roboto"/>
+              </a:rPr>
+              <a:t>Pruning: </a:t>
+            </a:r>
+            <a:r>
+              <a:rPr lang="en-US" b="0" i="0" dirty="0">
+                <a:solidFill>
+                  <a:srgbClr val="595858"/>
+                </a:solidFill>
+                <a:effectLst/>
+                <a:latin typeface="roboto"/>
+              </a:rPr>
+              <a:t>When we remove the sub-node of a decision node, it is called pruning. You can understand it as the opposite process of splitting.</a:t>
+            </a:r>
+          </a:p>
+          <a:p>
+            <a:pPr algn="l">
+              <a:buFont typeface="Arial" panose="020B0604020202020204" pitchFamily="34" charset="0"/>
+              <a:buChar char="•"/>
+            </a:pPr>
+            <a:r>
+              <a:rPr lang="en-US" b="1" i="0" dirty="0">
+                <a:solidFill>
+                  <a:srgbClr val="333333"/>
+                </a:solidFill>
+                <a:effectLst/>
+                <a:latin typeface="roboto"/>
+              </a:rPr>
+              <a:t>Branch/Sub-tree</a:t>
+            </a:r>
+            <a:r>
+              <a:rPr lang="en-US" b="0" i="0" dirty="0">
+                <a:solidFill>
+                  <a:srgbClr val="595858"/>
+                </a:solidFill>
+                <a:effectLst/>
+                <a:latin typeface="roboto"/>
+              </a:rPr>
+              <a:t>: a subsection of the entire tree is called a branch or sub-tree.</a:t>
             </a:r>
           </a:p>
           <a:p>
@@ -9483,7 +9517,7 @@
         </p:nvSpPr>
         <p:spPr>
           <a:xfrm>
-            <a:off x="2752437" y="5375564"/>
+            <a:off x="2724728" y="5763491"/>
             <a:ext cx="6096000" cy="369332"/>
           </a:xfrm>
           <a:prstGeom prst="rect">
@@ -9500,15 +9534,7 @@
             <a:pPr algn="ctr"/>
             <a:r>
               <a:rPr lang="en-IN" dirty="0"/>
-              <a:t>Source: </a:t>
-            </a:r>
-            <a:r>
-              <a:rPr lang="en-IN" dirty="0" err="1"/>
-              <a:t>Yorko</a:t>
-            </a:r>
-            <a:r>
-              <a:rPr lang="en-IN" dirty="0"/>
-              <a:t> Open ML Course</a:t>
+              <a:t>Source: Analytics Vidhya</a:t>
             </a:r>
           </a:p>
         </p:txBody>
@@ -9516,7 +9542,7 @@
     </p:spTree>
     <p:extLst>
       <p:ext uri="{BB962C8B-B14F-4D97-AF65-F5344CB8AC3E}">
-        <p14:creationId xmlns:p14="http://schemas.microsoft.com/office/powerpoint/2010/main" val="1031926667"/>
+        <p14:creationId xmlns:p14="http://schemas.microsoft.com/office/powerpoint/2010/main" val="395229379"/>
       </p:ext>
     </p:extLst>
   </p:cSld>
@@ -9548,7 +9574,7 @@
           <p:cNvPr id="2" name="Title 1">
             <a:extLst>
               <a:ext uri="{FF2B5EF4-FFF2-40B4-BE49-F238E27FC236}">
-                <a16:creationId xmlns:a16="http://schemas.microsoft.com/office/drawing/2014/main" id="{F3241FF8-EB2C-4D22-B416-E29C85E02FFE}"/>
+                <a16:creationId xmlns:a16="http://schemas.microsoft.com/office/drawing/2014/main" id="{1AEADCA6-B4DF-4AA5-9054-5B58E46F820B}"/>
               </a:ext>
             </a:extLst>
           </p:cNvPr>
@@ -9561,8 +9587,8 @@
         </p:nvSpPr>
         <p:spPr>
           <a:xfrm>
-            <a:off x="913775" y="618518"/>
-            <a:ext cx="10364451" cy="448284"/>
+            <a:off x="913774" y="268712"/>
+            <a:ext cx="10364451" cy="525615"/>
           </a:xfrm>
         </p:spPr>
         <p:txBody>
@@ -9573,7 +9599,7 @@
           <a:p>
             <a:r>
               <a:rPr lang="en-IN" dirty="0"/>
-              <a:t>Classification and regression trees (CART)</a:t>
+              <a:t>How Do You Create a decision tree?</a:t>
             </a:r>
           </a:p>
         </p:txBody>
@@ -9583,7 +9609,7 @@
           <p:cNvPr id="3" name="Content Placeholder 2">
             <a:extLst>
               <a:ext uri="{FF2B5EF4-FFF2-40B4-BE49-F238E27FC236}">
-                <a16:creationId xmlns:a16="http://schemas.microsoft.com/office/drawing/2014/main" id="{52F8F093-EB85-4BAC-A98D-61E8559C50AA}"/>
+                <a16:creationId xmlns:a16="http://schemas.microsoft.com/office/drawing/2014/main" id="{9EB60A50-381B-4094-BE6E-C39D3FEF631C}"/>
               </a:ext>
             </a:extLst>
           </p:cNvPr>
@@ -9596,98 +9622,205 @@
         </p:nvSpPr>
         <p:spPr>
           <a:xfrm>
-            <a:off x="1043083" y="1231019"/>
-            <a:ext cx="10363826" cy="3424107"/>
+            <a:off x="913774" y="794328"/>
+            <a:ext cx="10363826" cy="4294908"/>
           </a:xfrm>
         </p:spPr>
         <p:txBody>
           <a:bodyPr>
-            <a:normAutofit fontScale="92500" lnSpcReduction="20000"/>
+            <a:normAutofit/>
           </a:bodyPr>
           <a:lstStyle/>
           <a:p>
+            <a:pPr algn="l">
+              <a:buFont typeface="Arial" panose="020B0604020202020204" pitchFamily="34" charset="0"/>
+              <a:buChar char="•"/>
+            </a:pPr>
+            <a:r>
+              <a:rPr lang="en-US" dirty="0">
+                <a:solidFill>
+                  <a:srgbClr val="595858"/>
+                </a:solidFill>
+                <a:latin typeface="roboto"/>
+              </a:rPr>
+              <a:t>Biggest question. Where do you start from?</a:t>
+            </a:r>
+          </a:p>
+          <a:p>
+            <a:pPr algn="l">
+              <a:buFont typeface="Arial" panose="020B0604020202020204" pitchFamily="34" charset="0"/>
+              <a:buChar char="•"/>
+            </a:pPr>
+            <a:r>
+              <a:rPr lang="en-US" b="0" i="0" dirty="0">
+                <a:solidFill>
+                  <a:srgbClr val="595858"/>
+                </a:solidFill>
+                <a:effectLst/>
+                <a:latin typeface="roboto"/>
+              </a:rPr>
+              <a:t>We cant arbitrarily choose a root node</a:t>
+            </a:r>
+            <a:r>
+              <a:rPr lang="en-US" dirty="0">
+                <a:solidFill>
+                  <a:srgbClr val="595858"/>
+                </a:solidFill>
+                <a:latin typeface="roboto"/>
+              </a:rPr>
+              <a:t>. So how we decide what should be our root node? Which feature do we look at to make the first split?</a:t>
+            </a:r>
+          </a:p>
+          <a:p>
+            <a:pPr algn="l">
+              <a:buFont typeface="Arial" panose="020B0604020202020204" pitchFamily="34" charset="0"/>
+              <a:buChar char="•"/>
+            </a:pPr>
+            <a:r>
+              <a:rPr lang="en-US" b="0" i="0" dirty="0">
+                <a:solidFill>
+                  <a:srgbClr val="595858"/>
+                </a:solidFill>
+                <a:effectLst/>
+                <a:latin typeface="roboto"/>
+              </a:rPr>
+              <a:t>Think o</a:t>
+            </a:r>
+            <a:r>
+              <a:rPr lang="en-US" dirty="0">
+                <a:solidFill>
+                  <a:srgbClr val="595858"/>
+                </a:solidFill>
+                <a:latin typeface="roboto"/>
+              </a:rPr>
+              <a:t>f the game </a:t>
+            </a:r>
+            <a:r>
+              <a:rPr lang="en-US" b="1" dirty="0">
+                <a:solidFill>
+                  <a:srgbClr val="595858"/>
+                </a:solidFill>
+                <a:latin typeface="roboto"/>
+              </a:rPr>
+              <a:t>‘GUESS the CELEBRITY’. </a:t>
+            </a:r>
+            <a:r>
+              <a:rPr lang="en-US" dirty="0">
+                <a:solidFill>
+                  <a:srgbClr val="595858"/>
+                </a:solidFill>
+                <a:latin typeface="roboto"/>
+              </a:rPr>
+              <a:t>You have 20 questions to guess the celebrity I am thinking of. </a:t>
+            </a:r>
+          </a:p>
+          <a:p>
+            <a:pPr algn="l">
+              <a:buFont typeface="Arial" panose="020B0604020202020204" pitchFamily="34" charset="0"/>
+              <a:buChar char="•"/>
+            </a:pPr>
+            <a:r>
+              <a:rPr lang="en-US" b="0" i="0" dirty="0">
+                <a:solidFill>
+                  <a:srgbClr val="595858"/>
+                </a:solidFill>
+                <a:effectLst/>
+                <a:latin typeface="roboto"/>
+              </a:rPr>
+              <a:t>I will only answer in yes or no</a:t>
+            </a:r>
+            <a:r>
+              <a:rPr lang="en-US" dirty="0">
+                <a:solidFill>
+                  <a:srgbClr val="595858"/>
+                </a:solidFill>
+                <a:latin typeface="roboto"/>
+              </a:rPr>
+              <a:t>’s. Then you ask the next question.</a:t>
+            </a:r>
+          </a:p>
+          <a:p>
+            <a:pPr algn="l">
+              <a:buFont typeface="Arial" panose="020B0604020202020204" pitchFamily="34" charset="0"/>
+              <a:buChar char="•"/>
+            </a:pPr>
+            <a:r>
+              <a:rPr lang="en-US" b="0" i="0" dirty="0">
+                <a:solidFill>
+                  <a:srgbClr val="595858"/>
+                </a:solidFill>
+                <a:effectLst/>
+                <a:latin typeface="roboto"/>
+              </a:rPr>
+              <a:t>Obviously the first question should tell you most about a celebrity. So the first question should be if the person is a male or a female as this gives us </a:t>
+            </a:r>
+            <a:r>
+              <a:rPr lang="en-US" b="1" i="0" dirty="0">
+                <a:solidFill>
+                  <a:srgbClr val="595858"/>
+                </a:solidFill>
+                <a:effectLst/>
+                <a:latin typeface="roboto"/>
+              </a:rPr>
+              <a:t>maximum information gain.</a:t>
+            </a:r>
+          </a:p>
+          <a:p>
+            <a:pPr marL="0" indent="0">
+              <a:buNone/>
+            </a:pPr>
+            <a:endParaRPr lang="en-IN" dirty="0"/>
+          </a:p>
+        </p:txBody>
+      </p:sp>
+      <p:sp>
+        <p:nvSpPr>
+          <p:cNvPr id="5" name="TextBox 4">
+            <a:extLst>
+              <a:ext uri="{FF2B5EF4-FFF2-40B4-BE49-F238E27FC236}">
+                <a16:creationId xmlns:a16="http://schemas.microsoft.com/office/drawing/2014/main" id="{04696FEE-2F40-4C65-B25A-D5B61ABCF255}"/>
+              </a:ext>
+            </a:extLst>
+          </p:cNvPr>
+          <p:cNvSpPr txBox="1"/>
+          <p:nvPr/>
+        </p:nvSpPr>
+        <p:spPr>
+          <a:xfrm>
+            <a:off x="2752437" y="5375564"/>
+            <a:ext cx="6096000" cy="369332"/>
+          </a:xfrm>
+          <a:prstGeom prst="rect">
+            <a:avLst/>
+          </a:prstGeom>
+          <a:noFill/>
+        </p:spPr>
+        <p:txBody>
+          <a:bodyPr wrap="square">
+            <a:spAutoFit/>
+          </a:bodyPr>
+          <a:lstStyle/>
+          <a:p>
+            <a:pPr algn="ctr"/>
             <a:r>
               <a:rPr lang="en-IN" dirty="0"/>
-              <a:t>Decision trees can perform both classification and regression.</a:t>
-            </a:r>
-          </a:p>
-          <a:p>
-            <a:r>
-              <a:rPr lang="en-US" dirty="0"/>
-              <a:t>A </a:t>
-            </a:r>
-            <a:r>
-              <a:rPr lang="en-US" b="1" dirty="0"/>
-              <a:t>regression tree </a:t>
-            </a:r>
-            <a:r>
-              <a:rPr lang="en-US" dirty="0"/>
-              <a:t>is used when the </a:t>
-            </a:r>
-            <a:r>
-              <a:rPr lang="en-US" b="1" dirty="0"/>
-              <a:t>dependent variable is continuous</a:t>
-            </a:r>
-            <a:r>
-              <a:rPr lang="en-US" dirty="0"/>
-              <a:t>. </a:t>
-            </a:r>
-          </a:p>
-          <a:p>
-            <a:r>
-              <a:rPr lang="en-US" dirty="0"/>
-              <a:t>The value obtained by leaf nodes in the training data is the mean response of observation falling in that region. </a:t>
-            </a:r>
-          </a:p>
-          <a:p>
-            <a:r>
-              <a:rPr lang="en-US" dirty="0"/>
-              <a:t>Thus, if an unseen data observation falls in that region, its prediction is made with the </a:t>
-            </a:r>
-            <a:r>
-              <a:rPr lang="en-US" b="1" dirty="0"/>
-              <a:t>mean value</a:t>
-            </a:r>
-            <a:r>
-              <a:rPr lang="en-US" dirty="0"/>
-              <a:t>.</a:t>
-            </a:r>
-          </a:p>
-          <a:p>
-            <a:r>
-              <a:rPr lang="en-US" dirty="0"/>
-              <a:t>A classification tree is used when the </a:t>
-            </a:r>
-            <a:r>
-              <a:rPr lang="en-US" b="1" dirty="0"/>
-              <a:t>dependent variable is categorical</a:t>
-            </a:r>
-            <a:r>
-              <a:rPr lang="en-US" dirty="0"/>
-              <a:t>. </a:t>
-            </a:r>
-          </a:p>
-          <a:p>
-            <a:r>
-              <a:rPr lang="en-US" dirty="0"/>
-              <a:t>The value obtained by leaf nodes in the training data is the </a:t>
-            </a:r>
-            <a:r>
-              <a:rPr lang="en-US" b="1" dirty="0"/>
-              <a:t>mode response </a:t>
-            </a:r>
-            <a:r>
-              <a:rPr lang="en-US" dirty="0"/>
-              <a:t>of observation falling in that region</a:t>
-            </a:r>
-            <a:endParaRPr lang="en-IN" dirty="0"/>
+              <a:t>Source: </a:t>
+            </a:r>
+            <a:r>
+              <a:rPr lang="en-IN" dirty="0" err="1"/>
+              <a:t>Yorko</a:t>
+            </a:r>
+            <a:r>
+              <a:rPr lang="en-IN" dirty="0"/>
+              <a:t> Open ML Course</a:t>
+            </a:r>
           </a:p>
         </p:txBody>
       </p:sp>
     </p:spTree>
     <p:extLst>
       <p:ext uri="{BB962C8B-B14F-4D97-AF65-F5344CB8AC3E}">
-        <p14:creationId xmlns:p14="http://schemas.microsoft.com/office/powerpoint/2010/main" val="2686286529"/>
+        <p14:creationId xmlns:p14="http://schemas.microsoft.com/office/powerpoint/2010/main" val="1031926667"/>
       </p:ext>
     </p:extLst>
   </p:cSld>
@@ -9719,6 +9852,177 @@
           <p:cNvPr id="2" name="Title 1">
             <a:extLst>
               <a:ext uri="{FF2B5EF4-FFF2-40B4-BE49-F238E27FC236}">
+                <a16:creationId xmlns:a16="http://schemas.microsoft.com/office/drawing/2014/main" id="{F3241FF8-EB2C-4D22-B416-E29C85E02FFE}"/>
+              </a:ext>
+            </a:extLst>
+          </p:cNvPr>
+          <p:cNvSpPr>
+            <a:spLocks noGrp="1"/>
+          </p:cNvSpPr>
+          <p:nvPr>
+            <p:ph type="title"/>
+          </p:nvPr>
+        </p:nvSpPr>
+        <p:spPr>
+          <a:xfrm>
+            <a:off x="913775" y="618518"/>
+            <a:ext cx="10364451" cy="448284"/>
+          </a:xfrm>
+        </p:spPr>
+        <p:txBody>
+          <a:bodyPr>
+            <a:normAutofit fontScale="90000"/>
+          </a:bodyPr>
+          <a:lstStyle/>
+          <a:p>
+            <a:r>
+              <a:rPr lang="en-IN" dirty="0"/>
+              <a:t>Classification and regression trees (CART)</a:t>
+            </a:r>
+          </a:p>
+        </p:txBody>
+      </p:sp>
+      <p:sp>
+        <p:nvSpPr>
+          <p:cNvPr id="3" name="Content Placeholder 2">
+            <a:extLst>
+              <a:ext uri="{FF2B5EF4-FFF2-40B4-BE49-F238E27FC236}">
+                <a16:creationId xmlns:a16="http://schemas.microsoft.com/office/drawing/2014/main" id="{52F8F093-EB85-4BAC-A98D-61E8559C50AA}"/>
+              </a:ext>
+            </a:extLst>
+          </p:cNvPr>
+          <p:cNvSpPr>
+            <a:spLocks noGrp="1"/>
+          </p:cNvSpPr>
+          <p:nvPr>
+            <p:ph sz="quarter" idx="13"/>
+          </p:nvPr>
+        </p:nvSpPr>
+        <p:spPr>
+          <a:xfrm>
+            <a:off x="1043083" y="1231019"/>
+            <a:ext cx="10363826" cy="3424107"/>
+          </a:xfrm>
+        </p:spPr>
+        <p:txBody>
+          <a:bodyPr>
+            <a:normAutofit fontScale="92500" lnSpcReduction="20000"/>
+          </a:bodyPr>
+          <a:lstStyle/>
+          <a:p>
+            <a:r>
+              <a:rPr lang="en-IN" dirty="0"/>
+              <a:t>Decision trees can perform both classification and regression.</a:t>
+            </a:r>
+          </a:p>
+          <a:p>
+            <a:r>
+              <a:rPr lang="en-US" dirty="0"/>
+              <a:t>A </a:t>
+            </a:r>
+            <a:r>
+              <a:rPr lang="en-US" b="1" dirty="0"/>
+              <a:t>regression tree </a:t>
+            </a:r>
+            <a:r>
+              <a:rPr lang="en-US" dirty="0"/>
+              <a:t>is used when the </a:t>
+            </a:r>
+            <a:r>
+              <a:rPr lang="en-US" b="1" dirty="0"/>
+              <a:t>dependent variable is continuous</a:t>
+            </a:r>
+            <a:r>
+              <a:rPr lang="en-US" dirty="0"/>
+              <a:t>. </a:t>
+            </a:r>
+          </a:p>
+          <a:p>
+            <a:r>
+              <a:rPr lang="en-US" dirty="0"/>
+              <a:t>The value obtained by leaf nodes in the training data is the mean response of observation falling in that region. </a:t>
+            </a:r>
+          </a:p>
+          <a:p>
+            <a:r>
+              <a:rPr lang="en-US" dirty="0"/>
+              <a:t>Thus, if an unseen data observation falls in that region, its prediction is made with the </a:t>
+            </a:r>
+            <a:r>
+              <a:rPr lang="en-US" b="1" dirty="0"/>
+              <a:t>mean value</a:t>
+            </a:r>
+            <a:r>
+              <a:rPr lang="en-US" dirty="0"/>
+              <a:t>.</a:t>
+            </a:r>
+          </a:p>
+          <a:p>
+            <a:r>
+              <a:rPr lang="en-US" dirty="0"/>
+              <a:t>A classification tree is used when the </a:t>
+            </a:r>
+            <a:r>
+              <a:rPr lang="en-US" b="1" dirty="0"/>
+              <a:t>dependent variable is categorical</a:t>
+            </a:r>
+            <a:r>
+              <a:rPr lang="en-US" dirty="0"/>
+              <a:t>. </a:t>
+            </a:r>
+          </a:p>
+          <a:p>
+            <a:r>
+              <a:rPr lang="en-US" dirty="0"/>
+              <a:t>The value obtained by leaf nodes in the training data is the </a:t>
+            </a:r>
+            <a:r>
+              <a:rPr lang="en-US" b="1" dirty="0"/>
+              <a:t>mode response </a:t>
+            </a:r>
+            <a:r>
+              <a:rPr lang="en-US" dirty="0"/>
+              <a:t>of observation falling in that region</a:t>
+            </a:r>
+            <a:endParaRPr lang="en-IN" dirty="0"/>
+          </a:p>
+        </p:txBody>
+      </p:sp>
+    </p:spTree>
+    <p:extLst>
+      <p:ext uri="{BB962C8B-B14F-4D97-AF65-F5344CB8AC3E}">
+        <p14:creationId xmlns:p14="http://schemas.microsoft.com/office/powerpoint/2010/main" val="2686286529"/>
+      </p:ext>
+    </p:extLst>
+  </p:cSld>
+  <p:clrMapOvr>
+    <a:masterClrMapping/>
+  </p:clrMapOvr>
+</p:sld>
+</file>
+
+<file path=ppt/slides/slide8.xml><?xml version="1.0" encoding="utf-8"?>
+<p:sld xmlns:a="http://schemas.openxmlformats.org/drawingml/2006/main" xmlns:r="http://schemas.openxmlformats.org/officeDocument/2006/relationships" xmlns:p="http://schemas.openxmlformats.org/presentationml/2006/main">
+  <p:cSld>
+    <p:spTree>
+      <p:nvGrpSpPr>
+        <p:cNvPr id="1" name=""/>
+        <p:cNvGrpSpPr/>
+        <p:nvPr/>
+      </p:nvGrpSpPr>
+      <p:grpSpPr>
+        <a:xfrm>
+          <a:off x="0" y="0"/>
+          <a:ext cx="0" cy="0"/>
+          <a:chOff x="0" y="0"/>
+          <a:chExt cx="0" cy="0"/>
+        </a:xfrm>
+      </p:grpSpPr>
+      <p:sp>
+        <p:nvSpPr>
+          <p:cNvPr id="2" name="Title 1">
+            <a:extLst>
+              <a:ext uri="{FF2B5EF4-FFF2-40B4-BE49-F238E27FC236}">
                 <a16:creationId xmlns:a16="http://schemas.microsoft.com/office/drawing/2014/main" id="{1AEADCA6-B4DF-4AA5-9054-5B58E46F820B}"/>
               </a:ext>
             </a:extLst>
@@ -9895,7 +10199,7 @@
 </p:sld>
 </file>
 
-<file path=ppt/slides/slide8.xml><?xml version="1.0" encoding="utf-8"?>
+<file path=ppt/slides/slide9.xml><?xml version="1.0" encoding="utf-8"?>
 <p:sld xmlns:a="http://schemas.openxmlformats.org/drawingml/2006/main" xmlns:r="http://schemas.openxmlformats.org/officeDocument/2006/relationships" xmlns:p="http://schemas.openxmlformats.org/presentationml/2006/main">
   <p:cSld>
     <p:spTree>
@@ -10182,195 +10486,6 @@
     <p:extLst>
       <p:ext uri="{BB962C8B-B14F-4D97-AF65-F5344CB8AC3E}">
         <p14:creationId xmlns:p14="http://schemas.microsoft.com/office/powerpoint/2010/main" val="3649851357"/>
-      </p:ext>
-    </p:extLst>
-  </p:cSld>
-  <p:clrMapOvr>
-    <a:masterClrMapping/>
-  </p:clrMapOvr>
-</p:sld>
-</file>
-
-<file path=ppt/slides/slide9.xml><?xml version="1.0" encoding="utf-8"?>
-<p:sld xmlns:a="http://schemas.openxmlformats.org/drawingml/2006/main" xmlns:r="http://schemas.openxmlformats.org/officeDocument/2006/relationships" xmlns:p="http://schemas.openxmlformats.org/presentationml/2006/main">
-  <p:cSld>
-    <p:spTree>
-      <p:nvGrpSpPr>
-        <p:cNvPr id="1" name=""/>
-        <p:cNvGrpSpPr/>
-        <p:nvPr/>
-      </p:nvGrpSpPr>
-      <p:grpSpPr>
-        <a:xfrm>
-          <a:off x="0" y="0"/>
-          <a:ext cx="0" cy="0"/>
-          <a:chOff x="0" y="0"/>
-          <a:chExt cx="0" cy="0"/>
-        </a:xfrm>
-      </p:grpSpPr>
-      <p:sp>
-        <p:nvSpPr>
-          <p:cNvPr id="2" name="Title 1">
-            <a:extLst>
-              <a:ext uri="{FF2B5EF4-FFF2-40B4-BE49-F238E27FC236}">
-                <a16:creationId xmlns:a16="http://schemas.microsoft.com/office/drawing/2014/main" id="{10141CC6-6CEE-4A97-B1DA-1EF5CB69D511}"/>
-              </a:ext>
-            </a:extLst>
-          </p:cNvPr>
-          <p:cNvSpPr>
-            <a:spLocks noGrp="1"/>
-          </p:cNvSpPr>
-          <p:nvPr>
-            <p:ph type="title"/>
-          </p:nvPr>
-        </p:nvSpPr>
-        <p:spPr>
-          <a:xfrm>
-            <a:off x="913775" y="618517"/>
-            <a:ext cx="10364451" cy="656101"/>
-          </a:xfrm>
-        </p:spPr>
-        <p:txBody>
-          <a:bodyPr/>
-          <a:lstStyle/>
-          <a:p>
-            <a:r>
-              <a:rPr lang="en-IN" dirty="0"/>
-              <a:t>GINI Calculations in the previous 3 examples</a:t>
-            </a:r>
-          </a:p>
-        </p:txBody>
-      </p:sp>
-      <p:sp>
-        <p:nvSpPr>
-          <p:cNvPr id="5" name="TextBox 4">
-            <a:extLst>
-              <a:ext uri="{FF2B5EF4-FFF2-40B4-BE49-F238E27FC236}">
-                <a16:creationId xmlns:a16="http://schemas.microsoft.com/office/drawing/2014/main" id="{3AB38BE7-E475-4B38-9DE9-FF7F6F7BB621}"/>
-              </a:ext>
-            </a:extLst>
-          </p:cNvPr>
-          <p:cNvSpPr txBox="1"/>
-          <p:nvPr/>
-        </p:nvSpPr>
-        <p:spPr>
-          <a:xfrm>
-            <a:off x="1782618" y="6371555"/>
-            <a:ext cx="8857672" cy="369332"/>
-          </a:xfrm>
-          <a:prstGeom prst="rect">
-            <a:avLst/>
-          </a:prstGeom>
-          <a:noFill/>
-        </p:spPr>
-        <p:txBody>
-          <a:bodyPr wrap="square">
-            <a:spAutoFit/>
-          </a:bodyPr>
-          <a:lstStyle/>
-          <a:p>
-            <a:pPr algn="ctr"/>
-            <a:r>
-              <a:rPr lang="en-IN" dirty="0"/>
-              <a:t>Source: https://towardsdatascience.com/gini-index-vs-information-entropy-7a7e4fed3fcb</a:t>
-            </a:r>
-          </a:p>
-        </p:txBody>
-      </p:sp>
-      <p:pic>
-        <p:nvPicPr>
-          <p:cNvPr id="6" name="Picture 5">
-            <a:extLst>
-              <a:ext uri="{FF2B5EF4-FFF2-40B4-BE49-F238E27FC236}">
-                <a16:creationId xmlns:a16="http://schemas.microsoft.com/office/drawing/2014/main" id="{46B15514-08DC-46FB-81A0-8342FE731669}"/>
-              </a:ext>
-            </a:extLst>
-          </p:cNvPr>
-          <p:cNvPicPr>
-            <a:picLocks noChangeAspect="1"/>
-          </p:cNvPicPr>
-          <p:nvPr/>
-        </p:nvPicPr>
-        <p:blipFill>
-          <a:blip r:embed="rId2"/>
-          <a:stretch>
-            <a:fillRect/>
-          </a:stretch>
-        </p:blipFill>
-        <p:spPr>
-          <a:xfrm>
-            <a:off x="1219200" y="1505672"/>
-            <a:ext cx="8534400" cy="1356066"/>
-          </a:xfrm>
-          <a:prstGeom prst="rect">
-            <a:avLst/>
-          </a:prstGeom>
-        </p:spPr>
-      </p:pic>
-      <p:pic>
-        <p:nvPicPr>
-          <p:cNvPr id="7" name="Picture 6">
-            <a:extLst>
-              <a:ext uri="{FF2B5EF4-FFF2-40B4-BE49-F238E27FC236}">
-                <a16:creationId xmlns:a16="http://schemas.microsoft.com/office/drawing/2014/main" id="{6B49D80B-374B-49F5-AE7A-659C5428A74D}"/>
-              </a:ext>
-            </a:extLst>
-          </p:cNvPr>
-          <p:cNvPicPr>
-            <a:picLocks noChangeAspect="1"/>
-          </p:cNvPicPr>
-          <p:nvPr/>
-        </p:nvPicPr>
-        <p:blipFill>
-          <a:blip r:embed="rId3"/>
-          <a:stretch>
-            <a:fillRect/>
-          </a:stretch>
-        </p:blipFill>
-        <p:spPr>
-          <a:xfrm>
-            <a:off x="1219198" y="3168269"/>
-            <a:ext cx="8534399" cy="1448377"/>
-          </a:xfrm>
-          <a:prstGeom prst="rect">
-            <a:avLst/>
-          </a:prstGeom>
-        </p:spPr>
-      </p:pic>
-      <p:pic>
-        <p:nvPicPr>
-          <p:cNvPr id="8" name="Picture 7">
-            <a:extLst>
-              <a:ext uri="{FF2B5EF4-FFF2-40B4-BE49-F238E27FC236}">
-                <a16:creationId xmlns:a16="http://schemas.microsoft.com/office/drawing/2014/main" id="{2929F046-11CC-4688-B9BD-FF057AF5EE95}"/>
-              </a:ext>
-            </a:extLst>
-          </p:cNvPr>
-          <p:cNvPicPr>
-            <a:picLocks noChangeAspect="1"/>
-          </p:cNvPicPr>
-          <p:nvPr/>
-        </p:nvPicPr>
-        <p:blipFill>
-          <a:blip r:embed="rId4"/>
-          <a:stretch>
-            <a:fillRect/>
-          </a:stretch>
-        </p:blipFill>
-        <p:spPr>
-          <a:xfrm>
-            <a:off x="1219197" y="4923177"/>
-            <a:ext cx="8534399" cy="1419225"/>
-          </a:xfrm>
-          <a:prstGeom prst="rect">
-            <a:avLst/>
-          </a:prstGeom>
-        </p:spPr>
-      </p:pic>
-    </p:spTree>
-    <p:extLst>
-      <p:ext uri="{BB962C8B-B14F-4D97-AF65-F5344CB8AC3E}">
-        <p14:creationId xmlns:p14="http://schemas.microsoft.com/office/powerpoint/2010/main" val="3718577835"/>
       </p:ext>
     </p:extLst>
   </p:cSld>

</xml_diff>